<commit_message>
added code for review
</commit_message>
<xml_diff>
--- a/03-Working-in-Teams.pptx
+++ b/03-Working-in-Teams.pptx
@@ -5,10 +5,10 @@
     <p:sldMasterId id="2147483648" r:id="rId1"/>
   </p:sldMasterIdLst>
   <p:notesMasterIdLst>
-    <p:notesMasterId r:id="rId24"/>
+    <p:notesMasterId r:id="rId25"/>
   </p:notesMasterIdLst>
   <p:handoutMasterIdLst>
-    <p:handoutMasterId r:id="rId25"/>
+    <p:handoutMasterId r:id="rId26"/>
   </p:handoutMasterIdLst>
   <p:sldIdLst>
     <p:sldId id="480" r:id="rId2"/>
@@ -22,17 +22,18 @@
     <p:sldId id="487" r:id="rId10"/>
     <p:sldId id="458" r:id="rId11"/>
     <p:sldId id="472" r:id="rId12"/>
-    <p:sldId id="488" r:id="rId13"/>
-    <p:sldId id="465" r:id="rId14"/>
-    <p:sldId id="467" r:id="rId15"/>
-    <p:sldId id="491" r:id="rId16"/>
-    <p:sldId id="492" r:id="rId17"/>
-    <p:sldId id="493" r:id="rId18"/>
-    <p:sldId id="474" r:id="rId19"/>
-    <p:sldId id="475" r:id="rId20"/>
-    <p:sldId id="490" r:id="rId21"/>
-    <p:sldId id="476" r:id="rId22"/>
-    <p:sldId id="489" r:id="rId23"/>
+    <p:sldId id="494" r:id="rId13"/>
+    <p:sldId id="488" r:id="rId14"/>
+    <p:sldId id="465" r:id="rId15"/>
+    <p:sldId id="467" r:id="rId16"/>
+    <p:sldId id="491" r:id="rId17"/>
+    <p:sldId id="492" r:id="rId18"/>
+    <p:sldId id="493" r:id="rId19"/>
+    <p:sldId id="474" r:id="rId20"/>
+    <p:sldId id="475" r:id="rId21"/>
+    <p:sldId id="490" r:id="rId22"/>
+    <p:sldId id="476" r:id="rId23"/>
+    <p:sldId id="489" r:id="rId24"/>
   </p:sldIdLst>
   <p:sldSz cx="9144000" cy="6858000" type="screen4x3"/>
   <p:notesSz cx="6858000" cy="9144000"/>
@@ -8126,6 +8127,494 @@
       </p:grpSpPr>
       <p:sp>
         <p:nvSpPr>
+          <p:cNvPr id="37891" name="Footer Placeholder 1"/>
+          <p:cNvSpPr>
+            <a:spLocks noGrp="1"/>
+          </p:cNvSpPr>
+          <p:nvPr>
+            <p:ph type="ftr" sz="quarter" idx="10"/>
+          </p:nvPr>
+        </p:nvSpPr>
+        <p:spPr bwMode="auto">
+          <a:noFill/>
+          <a:extLst>
+            <a:ext uri="{909E8E84-426E-40DD-AFC4-6F175D3DCCD1}">
+              <a14:hiddenFill xmlns:a14="http://schemas.microsoft.com/office/drawing/2010/main">
+                <a:solidFill>
+                  <a:srgbClr val="FFFFFF"/>
+                </a:solidFill>
+              </a14:hiddenFill>
+            </a:ext>
+            <a:ext uri="{91240B29-F687-4F45-9708-019B960494DF}">
+              <a14:hiddenLine xmlns:a14="http://schemas.microsoft.com/office/drawing/2010/main" w="9525">
+                <a:solidFill>
+                  <a:srgbClr val="000000"/>
+                </a:solidFill>
+                <a:miter lim="800000"/>
+                <a:headEnd/>
+                <a:tailEnd/>
+              </a14:hiddenLine>
+            </a:ext>
+          </a:extLst>
+        </p:spPr>
+        <p:txBody>
+          <a:bodyPr/>
+          <a:lstStyle>
+            <a:lvl1pPr>
+              <a:defRPr>
+                <a:solidFill>
+                  <a:schemeClr val="tx1"/>
+                </a:solidFill>
+                <a:latin typeface="Arial" charset="0"/>
+                <a:ea typeface="ＭＳ Ｐゴシック" charset="-128"/>
+              </a:defRPr>
+            </a:lvl1pPr>
+            <a:lvl2pPr marL="742950" indent="-285750">
+              <a:defRPr>
+                <a:solidFill>
+                  <a:schemeClr val="tx1"/>
+                </a:solidFill>
+                <a:latin typeface="Arial" charset="0"/>
+                <a:ea typeface="ＭＳ Ｐゴシック" charset="-128"/>
+              </a:defRPr>
+            </a:lvl2pPr>
+            <a:lvl3pPr marL="1143000" indent="-228600">
+              <a:defRPr>
+                <a:solidFill>
+                  <a:schemeClr val="tx1"/>
+                </a:solidFill>
+                <a:latin typeface="Arial" charset="0"/>
+                <a:ea typeface="ＭＳ Ｐゴシック" charset="-128"/>
+              </a:defRPr>
+            </a:lvl3pPr>
+            <a:lvl4pPr marL="1600200" indent="-228600">
+              <a:defRPr>
+                <a:solidFill>
+                  <a:schemeClr val="tx1"/>
+                </a:solidFill>
+                <a:latin typeface="Arial" charset="0"/>
+                <a:ea typeface="ＭＳ Ｐゴシック" charset="-128"/>
+              </a:defRPr>
+            </a:lvl4pPr>
+            <a:lvl5pPr marL="2057400" indent="-228600">
+              <a:defRPr>
+                <a:solidFill>
+                  <a:schemeClr val="tx1"/>
+                </a:solidFill>
+                <a:latin typeface="Arial" charset="0"/>
+                <a:ea typeface="ＭＳ Ｐゴシック" charset="-128"/>
+              </a:defRPr>
+            </a:lvl5pPr>
+            <a:lvl6pPr marL="2514600" indent="-228600" defTabSz="457200" eaLnBrk="0" fontAlgn="base" hangingPunct="0">
+              <a:spcBef>
+                <a:spcPct val="0"/>
+              </a:spcBef>
+              <a:spcAft>
+                <a:spcPct val="0"/>
+              </a:spcAft>
+              <a:defRPr>
+                <a:solidFill>
+                  <a:schemeClr val="tx1"/>
+                </a:solidFill>
+                <a:latin typeface="Arial" charset="0"/>
+                <a:ea typeface="ＭＳ Ｐゴシック" charset="-128"/>
+              </a:defRPr>
+            </a:lvl6pPr>
+            <a:lvl7pPr marL="2971800" indent="-228600" defTabSz="457200" eaLnBrk="0" fontAlgn="base" hangingPunct="0">
+              <a:spcBef>
+                <a:spcPct val="0"/>
+              </a:spcBef>
+              <a:spcAft>
+                <a:spcPct val="0"/>
+              </a:spcAft>
+              <a:defRPr>
+                <a:solidFill>
+                  <a:schemeClr val="tx1"/>
+                </a:solidFill>
+                <a:latin typeface="Arial" charset="0"/>
+                <a:ea typeface="ＭＳ Ｐゴシック" charset="-128"/>
+              </a:defRPr>
+            </a:lvl7pPr>
+            <a:lvl8pPr marL="3429000" indent="-228600" defTabSz="457200" eaLnBrk="0" fontAlgn="base" hangingPunct="0">
+              <a:spcBef>
+                <a:spcPct val="0"/>
+              </a:spcBef>
+              <a:spcAft>
+                <a:spcPct val="0"/>
+              </a:spcAft>
+              <a:defRPr>
+                <a:solidFill>
+                  <a:schemeClr val="tx1"/>
+                </a:solidFill>
+                <a:latin typeface="Arial" charset="0"/>
+                <a:ea typeface="ＭＳ Ｐゴシック" charset="-128"/>
+              </a:defRPr>
+            </a:lvl8pPr>
+            <a:lvl9pPr marL="3886200" indent="-228600" defTabSz="457200" eaLnBrk="0" fontAlgn="base" hangingPunct="0">
+              <a:spcBef>
+                <a:spcPct val="0"/>
+              </a:spcBef>
+              <a:spcAft>
+                <a:spcPct val="0"/>
+              </a:spcAft>
+              <a:defRPr>
+                <a:solidFill>
+                  <a:schemeClr val="tx1"/>
+                </a:solidFill>
+                <a:latin typeface="Arial" charset="0"/>
+                <a:ea typeface="ＭＳ Ｐゴシック" charset="-128"/>
+              </a:defRPr>
+            </a:lvl9pPr>
+          </a:lstStyle>
+          <a:p>
+            <a:r>
+              <a:rPr lang="en-US" altLang="x-none" dirty="0" smtClean="0">
+                <a:solidFill>
+                  <a:srgbClr val="898989"/>
+                </a:solidFill>
+                <a:latin typeface="Calibri" charset="0"/>
+              </a:rPr>
+              <a:t>Beck, </a:t>
+            </a:r>
+            <a:r>
+              <a:rPr lang="en-US" altLang="x-none" dirty="0" err="1" smtClean="0">
+                <a:solidFill>
+                  <a:srgbClr val="898989"/>
+                </a:solidFill>
+                <a:latin typeface="Calibri" charset="0"/>
+              </a:rPr>
+              <a:t>Hellerstein</a:t>
+            </a:r>
+            <a:r>
+              <a:rPr lang="en-US" altLang="x-none" dirty="0" smtClean="0">
+                <a:solidFill>
+                  <a:srgbClr val="898989"/>
+                </a:solidFill>
+                <a:latin typeface="Calibri" charset="0"/>
+              </a:rPr>
+              <a:t> &amp; </a:t>
+            </a:r>
+            <a:r>
+              <a:rPr lang="en-US" altLang="x-none" dirty="0" err="1" smtClean="0">
+                <a:solidFill>
+                  <a:srgbClr val="898989"/>
+                </a:solidFill>
+                <a:latin typeface="Calibri" charset="0"/>
+              </a:rPr>
+              <a:t>VanderPlas</a:t>
+            </a:r>
+            <a:r>
+              <a:rPr lang="en-US" altLang="x-none" dirty="0" smtClean="0">
+                <a:solidFill>
+                  <a:srgbClr val="898989"/>
+                </a:solidFill>
+                <a:latin typeface="Calibri" charset="0"/>
+              </a:rPr>
+              <a:t>, 2018</a:t>
+            </a:r>
+            <a:endParaRPr lang="en-US" altLang="x-none" dirty="0">
+              <a:solidFill>
+                <a:srgbClr val="898989"/>
+              </a:solidFill>
+              <a:latin typeface="Calibri" charset="0"/>
+            </a:endParaRPr>
+          </a:p>
+        </p:txBody>
+      </p:sp>
+      <p:pic>
+        <p:nvPicPr>
+          <p:cNvPr id="7" name="Content Placeholder 6"/>
+          <p:cNvPicPr>
+            <a:picLocks noGrp="1" noChangeAspect="1"/>
+          </p:cNvPicPr>
+          <p:nvPr>
+            <p:ph idx="1"/>
+          </p:nvPr>
+        </p:nvPicPr>
+        <p:blipFill>
+          <a:blip r:embed="rId2"/>
+          <a:stretch>
+            <a:fillRect/>
+          </a:stretch>
+        </p:blipFill>
+        <p:spPr>
+          <a:xfrm>
+            <a:off x="447675" y="2362200"/>
+            <a:ext cx="8229600" cy="3515653"/>
+          </a:xfrm>
+          <a:prstGeom prst="rect">
+            <a:avLst/>
+          </a:prstGeom>
+        </p:spPr>
+      </p:pic>
+      <p:sp>
+        <p:nvSpPr>
+          <p:cNvPr id="8" name="Content Placeholder 3"/>
+          <p:cNvSpPr txBox="1">
+            <a:spLocks/>
+          </p:cNvSpPr>
+          <p:nvPr/>
+        </p:nvSpPr>
+        <p:spPr bwMode="auto">
+          <a:xfrm>
+            <a:off x="447675" y="609600"/>
+            <a:ext cx="8229600" cy="2286000"/>
+          </a:xfrm>
+          <a:prstGeom prst="rect">
+            <a:avLst/>
+          </a:prstGeom>
+          <a:noFill/>
+          <a:extLst>
+            <a:ext uri="{909E8E84-426E-40DD-AFC4-6F175D3DCCD1}">
+              <a14:hiddenFill xmlns:a14="http://schemas.microsoft.com/office/drawing/2010/main">
+                <a:solidFill>
+                  <a:srgbClr val="FFFFFF"/>
+                </a:solidFill>
+              </a14:hiddenFill>
+            </a:ext>
+            <a:ext uri="{91240B29-F687-4F45-9708-019B960494DF}">
+              <a14:hiddenLine xmlns:a14="http://schemas.microsoft.com/office/drawing/2010/main" w="9525">
+                <a:solidFill>
+                  <a:srgbClr val="000000"/>
+                </a:solidFill>
+                <a:miter lim="800000"/>
+                <a:headEnd/>
+                <a:tailEnd/>
+              </a14:hiddenLine>
+            </a:ext>
+          </a:extLst>
+        </p:spPr>
+        <p:txBody>
+          <a:bodyPr vert="horz" wrap="square" lIns="91440" tIns="45720" rIns="91440" bIns="45720" numCol="1" anchor="t" anchorCtr="0" compatLnSpc="1">
+            <a:prstTxWarp prst="textNoShape">
+              <a:avLst/>
+            </a:prstTxWarp>
+          </a:bodyPr>
+          <a:lstStyle>
+            <a:lvl1pPr marL="342900" indent="-342900" algn="l" defTabSz="457200" rtl="0" eaLnBrk="0" fontAlgn="base" hangingPunct="0">
+              <a:spcBef>
+                <a:spcPct val="20000"/>
+              </a:spcBef>
+              <a:spcAft>
+                <a:spcPct val="0"/>
+              </a:spcAft>
+              <a:buFont typeface="Arial" charset="0"/>
+              <a:buChar char="•"/>
+              <a:defRPr sz="3200" kern="1200">
+                <a:solidFill>
+                  <a:schemeClr val="tx1"/>
+                </a:solidFill>
+                <a:latin typeface="+mn-lt"/>
+                <a:ea typeface="ＭＳ Ｐゴシック" pitchFamily="-112" charset="-128"/>
+                <a:cs typeface="ＭＳ Ｐゴシック" pitchFamily="-112" charset="-128"/>
+              </a:defRPr>
+            </a:lvl1pPr>
+            <a:lvl2pPr marL="742950" indent="-285750" algn="l" defTabSz="457200" rtl="0" eaLnBrk="0" fontAlgn="base" hangingPunct="0">
+              <a:spcBef>
+                <a:spcPct val="20000"/>
+              </a:spcBef>
+              <a:spcAft>
+                <a:spcPct val="0"/>
+              </a:spcAft>
+              <a:buFont typeface="Arial" charset="0"/>
+              <a:buChar char="–"/>
+              <a:defRPr sz="2800" kern="1200">
+                <a:solidFill>
+                  <a:schemeClr val="tx1"/>
+                </a:solidFill>
+                <a:latin typeface="+mn-lt"/>
+                <a:ea typeface="ＭＳ Ｐゴシック" pitchFamily="-112" charset="-128"/>
+                <a:cs typeface="+mn-cs"/>
+              </a:defRPr>
+            </a:lvl2pPr>
+            <a:lvl3pPr marL="1143000" indent="-228600" algn="l" defTabSz="457200" rtl="0" eaLnBrk="0" fontAlgn="base" hangingPunct="0">
+              <a:spcBef>
+                <a:spcPct val="20000"/>
+              </a:spcBef>
+              <a:spcAft>
+                <a:spcPct val="0"/>
+              </a:spcAft>
+              <a:buFont typeface="Arial" charset="0"/>
+              <a:buChar char="•"/>
+              <a:defRPr sz="2400" kern="1200">
+                <a:solidFill>
+                  <a:schemeClr val="tx1"/>
+                </a:solidFill>
+                <a:latin typeface="+mn-lt"/>
+                <a:ea typeface="ＭＳ Ｐゴシック" pitchFamily="-112" charset="-128"/>
+                <a:cs typeface="+mn-cs"/>
+              </a:defRPr>
+            </a:lvl3pPr>
+            <a:lvl4pPr marL="1600200" indent="-228600" algn="l" defTabSz="457200" rtl="0" eaLnBrk="0" fontAlgn="base" hangingPunct="0">
+              <a:spcBef>
+                <a:spcPct val="20000"/>
+              </a:spcBef>
+              <a:spcAft>
+                <a:spcPct val="0"/>
+              </a:spcAft>
+              <a:buFont typeface="Arial" charset="0"/>
+              <a:buChar char="–"/>
+              <a:defRPr sz="2000" kern="1200">
+                <a:solidFill>
+                  <a:schemeClr val="tx1"/>
+                </a:solidFill>
+                <a:latin typeface="+mn-lt"/>
+                <a:ea typeface="ＭＳ Ｐゴシック" pitchFamily="-112" charset="-128"/>
+                <a:cs typeface="+mn-cs"/>
+              </a:defRPr>
+            </a:lvl4pPr>
+            <a:lvl5pPr marL="2057400" indent="-228600" algn="l" defTabSz="457200" rtl="0" eaLnBrk="0" fontAlgn="base" hangingPunct="0">
+              <a:spcBef>
+                <a:spcPct val="20000"/>
+              </a:spcBef>
+              <a:spcAft>
+                <a:spcPct val="0"/>
+              </a:spcAft>
+              <a:buFont typeface="Arial" charset="0"/>
+              <a:buChar char="»"/>
+              <a:defRPr sz="2000" kern="1200">
+                <a:solidFill>
+                  <a:schemeClr val="tx1"/>
+                </a:solidFill>
+                <a:latin typeface="+mn-lt"/>
+                <a:ea typeface="ＭＳ Ｐゴシック" pitchFamily="-112" charset="-128"/>
+                <a:cs typeface="+mn-cs"/>
+              </a:defRPr>
+            </a:lvl5pPr>
+            <a:lvl6pPr marL="2514600" indent="-228600" algn="l" defTabSz="457200" rtl="0" eaLnBrk="1" latinLnBrk="0" hangingPunct="1">
+              <a:spcBef>
+                <a:spcPct val="20000"/>
+              </a:spcBef>
+              <a:buFont typeface="Arial"/>
+              <a:buChar char="•"/>
+              <a:defRPr sz="2000" kern="1200">
+                <a:solidFill>
+                  <a:schemeClr val="tx1"/>
+                </a:solidFill>
+                <a:latin typeface="+mn-lt"/>
+                <a:ea typeface="+mn-ea"/>
+                <a:cs typeface="+mn-cs"/>
+              </a:defRPr>
+            </a:lvl6pPr>
+            <a:lvl7pPr marL="2971800" indent="-228600" algn="l" defTabSz="457200" rtl="0" eaLnBrk="1" latinLnBrk="0" hangingPunct="1">
+              <a:spcBef>
+                <a:spcPct val="20000"/>
+              </a:spcBef>
+              <a:buFont typeface="Arial"/>
+              <a:buChar char="•"/>
+              <a:defRPr sz="2000" kern="1200">
+                <a:solidFill>
+                  <a:schemeClr val="tx1"/>
+                </a:solidFill>
+                <a:latin typeface="+mn-lt"/>
+                <a:ea typeface="+mn-ea"/>
+                <a:cs typeface="+mn-cs"/>
+              </a:defRPr>
+            </a:lvl7pPr>
+            <a:lvl8pPr marL="3429000" indent="-228600" algn="l" defTabSz="457200" rtl="0" eaLnBrk="1" latinLnBrk="0" hangingPunct="1">
+              <a:spcBef>
+                <a:spcPct val="20000"/>
+              </a:spcBef>
+              <a:buFont typeface="Arial"/>
+              <a:buChar char="•"/>
+              <a:defRPr sz="2000" kern="1200">
+                <a:solidFill>
+                  <a:schemeClr val="tx1"/>
+                </a:solidFill>
+                <a:latin typeface="+mn-lt"/>
+                <a:ea typeface="+mn-ea"/>
+                <a:cs typeface="+mn-cs"/>
+              </a:defRPr>
+            </a:lvl8pPr>
+            <a:lvl9pPr marL="3886200" indent="-228600" algn="l" defTabSz="457200" rtl="0" eaLnBrk="1" latinLnBrk="0" hangingPunct="1">
+              <a:spcBef>
+                <a:spcPct val="20000"/>
+              </a:spcBef>
+              <a:buFont typeface="Arial"/>
+              <a:buChar char="•"/>
+              <a:defRPr sz="2000" kern="1200">
+                <a:solidFill>
+                  <a:schemeClr val="tx1"/>
+                </a:solidFill>
+                <a:latin typeface="+mn-lt"/>
+                <a:ea typeface="+mn-ea"/>
+                <a:cs typeface="+mn-cs"/>
+              </a:defRPr>
+            </a:lvl9pPr>
+          </a:lstStyle>
+          <a:p>
+            <a:r>
+              <a:rPr lang="en-US" altLang="x-none" dirty="0" smtClean="0">
+                <a:ea typeface="ＭＳ Ｐゴシック" charset="-128"/>
+              </a:rPr>
+              <a:t>Background</a:t>
+            </a:r>
+          </a:p>
+          <a:p>
+            <a:pPr lvl="1"/>
+            <a:r>
+              <a:rPr lang="en-US" altLang="x-none" dirty="0" smtClean="0">
+                <a:ea typeface="ＭＳ Ｐゴシック" charset="-128"/>
+              </a:rPr>
+              <a:t>This is some code that takes a list of numbers and returns a list of values &gt; two std. </a:t>
+            </a:r>
+            <a:r>
+              <a:rPr lang="en-US" altLang="x-none" smtClean="0">
+                <a:ea typeface="ＭＳ Ｐゴシック" charset="-128"/>
+              </a:rPr>
+              <a:t>dev. </a:t>
+            </a:r>
+            <a:r>
+              <a:rPr lang="en-US" altLang="x-none" dirty="0" smtClean="0">
+                <a:ea typeface="ＭＳ Ｐゴシック" charset="-128"/>
+              </a:rPr>
+              <a:t>from mean</a:t>
+            </a:r>
+            <a:endParaRPr lang="en-US" altLang="x-none" dirty="0">
+              <a:ea typeface="ＭＳ Ｐゴシック" charset="-128"/>
+            </a:endParaRPr>
+          </a:p>
+        </p:txBody>
+      </p:sp>
+    </p:spTree>
+    <p:extLst>
+      <p:ext uri="{BB962C8B-B14F-4D97-AF65-F5344CB8AC3E}">
+        <p14:creationId xmlns:p14="http://schemas.microsoft.com/office/powerpoint/2010/main" val="1111313249"/>
+      </p:ext>
+    </p:extLst>
+  </p:cSld>
+  <p:clrMapOvr>
+    <a:masterClrMapping/>
+  </p:clrMapOvr>
+  <p:timing>
+    <p:tnLst>
+      <p:par>
+        <p:cTn id="1" dur="indefinite" restart="never" nodeType="tmRoot"/>
+      </p:par>
+    </p:tnLst>
+  </p:timing>
+</p:sld>
+</file>
+
+<file path=ppt/slides/slide13.xml><?xml version="1.0" encoding="utf-8"?>
+<p:sld xmlns:a="http://schemas.openxmlformats.org/drawingml/2006/main" xmlns:r="http://schemas.openxmlformats.org/officeDocument/2006/relationships" xmlns:p="http://schemas.openxmlformats.org/presentationml/2006/main">
+  <p:cSld>
+    <p:spTree>
+      <p:nvGrpSpPr>
+        <p:cNvPr id="1" name=""/>
+        <p:cNvGrpSpPr/>
+        <p:nvPr/>
+      </p:nvGrpSpPr>
+      <p:grpSpPr>
+        <a:xfrm>
+          <a:off x="0" y="0"/>
+          <a:ext cx="0" cy="0"/>
+          <a:chOff x="0" y="0"/>
+          <a:chExt cx="0" cy="0"/>
+        </a:xfrm>
+      </p:grpSpPr>
+      <p:sp>
+        <p:nvSpPr>
           <p:cNvPr id="38913" name="Title 4"/>
           <p:cNvSpPr>
             <a:spLocks noGrp="1"/>
@@ -8388,7 +8877,7 @@
 </p:sld>
 </file>
 
-<file path=ppt/slides/slide13.xml><?xml version="1.0" encoding="utf-8"?>
+<file path=ppt/slides/slide14.xml><?xml version="1.0" encoding="utf-8"?>
 <p:sld xmlns:a="http://schemas.openxmlformats.org/drawingml/2006/main" xmlns:r="http://schemas.openxmlformats.org/officeDocument/2006/relationships" xmlns:p="http://schemas.openxmlformats.org/presentationml/2006/main">
   <p:cSld>
     <p:spTree>
@@ -9030,420 +9519,6 @@
 </p:sld>
 </file>
 
-<file path=ppt/slides/slide14.xml><?xml version="1.0" encoding="utf-8"?>
-<p:sld xmlns:a="http://schemas.openxmlformats.org/drawingml/2006/main" xmlns:r="http://schemas.openxmlformats.org/officeDocument/2006/relationships" xmlns:p="http://schemas.openxmlformats.org/presentationml/2006/main">
-  <p:cSld>
-    <p:spTree>
-      <p:nvGrpSpPr>
-        <p:cNvPr id="1" name=""/>
-        <p:cNvGrpSpPr/>
-        <p:nvPr/>
-      </p:nvGrpSpPr>
-      <p:grpSpPr>
-        <a:xfrm>
-          <a:off x="0" y="0"/>
-          <a:ext cx="0" cy="0"/>
-          <a:chOff x="0" y="0"/>
-          <a:chExt cx="0" cy="0"/>
-        </a:xfrm>
-      </p:grpSpPr>
-      <p:sp>
-        <p:nvSpPr>
-          <p:cNvPr id="40961" name="Title 1"/>
-          <p:cNvSpPr>
-            <a:spLocks noGrp="1"/>
-          </p:cNvSpPr>
-          <p:nvPr>
-            <p:ph type="title"/>
-          </p:nvPr>
-        </p:nvSpPr>
-        <p:spPr bwMode="auto">
-          <a:xfrm>
-            <a:off x="304800" y="381000"/>
-            <a:ext cx="8382000" cy="838200"/>
-          </a:xfrm>
-          <a:noFill/>
-          <a:extLst>
-            <a:ext uri="{909E8E84-426E-40DD-AFC4-6F175D3DCCD1}">
-              <a14:hiddenFill xmlns:a14="http://schemas.microsoft.com/office/drawing/2010/main">
-                <a:solidFill>
-                  <a:srgbClr val="FFFFFF"/>
-                </a:solidFill>
-              </a14:hiddenFill>
-            </a:ext>
-            <a:ext uri="{91240B29-F687-4F45-9708-019B960494DF}">
-              <a14:hiddenLine xmlns:a14="http://schemas.microsoft.com/office/drawing/2010/main" w="9525">
-                <a:solidFill>
-                  <a:srgbClr val="000000"/>
-                </a:solidFill>
-                <a:miter lim="800000"/>
-                <a:headEnd/>
-                <a:tailEnd/>
-              </a14:hiddenLine>
-            </a:ext>
-          </a:extLst>
-        </p:spPr>
-        <p:txBody>
-          <a:bodyPr vert="horz" wrap="square" lIns="91440" tIns="45720" rIns="91440" bIns="45720" numCol="1" anchor="t" anchorCtr="0" compatLnSpc="1">
-            <a:prstTxWarp prst="textNoShape">
-              <a:avLst/>
-            </a:prstTxWarp>
-          </a:bodyPr>
-          <a:lstStyle/>
-          <a:p>
-            <a:r>
-              <a:rPr lang="en-US" altLang="x-none" dirty="0">
-                <a:ea typeface="ＭＳ Ｐゴシック" charset="-128"/>
-              </a:rPr>
-              <a:t>Example of A Technology Review</a:t>
-            </a:r>
-            <a:br>
-              <a:rPr lang="en-US" altLang="x-none" dirty="0">
-                <a:ea typeface="ＭＳ Ｐゴシック" charset="-128"/>
-              </a:rPr>
-            </a:br>
-            <a:r>
-              <a:rPr lang="en-US" altLang="x-none" i="1" dirty="0" smtClean="0">
-                <a:ea typeface="ＭＳ Ｐゴシック" charset="-128"/>
-              </a:rPr>
-              <a:t>Command line argument parsing</a:t>
-            </a:r>
-            <a:endParaRPr lang="en-US" altLang="x-none" i="1" dirty="0">
-              <a:ea typeface="ＭＳ Ｐゴシック" charset="-128"/>
-            </a:endParaRPr>
-          </a:p>
-        </p:txBody>
-      </p:sp>
-      <p:sp>
-        <p:nvSpPr>
-          <p:cNvPr id="40962" name="Content Placeholder 2"/>
-          <p:cNvSpPr>
-            <a:spLocks noGrp="1"/>
-          </p:cNvSpPr>
-          <p:nvPr>
-            <p:ph idx="1"/>
-          </p:nvPr>
-        </p:nvSpPr>
-        <p:spPr bwMode="auto">
-          <a:xfrm>
-            <a:off x="457200" y="1600200"/>
-            <a:ext cx="8229600" cy="4572000"/>
-          </a:xfrm>
-          <a:noFill/>
-          <a:extLst>
-            <a:ext uri="{909E8E84-426E-40DD-AFC4-6F175D3DCCD1}">
-              <a14:hiddenFill xmlns:a14="http://schemas.microsoft.com/office/drawing/2010/main">
-                <a:solidFill>
-                  <a:srgbClr val="FFFFFF"/>
-                </a:solidFill>
-              </a14:hiddenFill>
-            </a:ext>
-            <a:ext uri="{91240B29-F687-4F45-9708-019B960494DF}">
-              <a14:hiddenLine xmlns:a14="http://schemas.microsoft.com/office/drawing/2010/main" w="9525">
-                <a:solidFill>
-                  <a:srgbClr val="000000"/>
-                </a:solidFill>
-                <a:miter lim="800000"/>
-                <a:headEnd/>
-                <a:tailEnd/>
-              </a14:hiddenLine>
-            </a:ext>
-          </a:extLst>
-        </p:spPr>
-        <p:txBody>
-          <a:bodyPr vert="horz" wrap="square" lIns="91440" tIns="45720" rIns="91440" bIns="45720" numCol="1" anchor="t" anchorCtr="0" compatLnSpc="1">
-            <a:prstTxWarp prst="textNoShape">
-              <a:avLst/>
-            </a:prstTxWarp>
-          </a:bodyPr>
-          <a:lstStyle/>
-          <a:p>
-            <a:r>
-              <a:rPr lang="en-US" altLang="x-none" dirty="0">
-                <a:ea typeface="ＭＳ Ｐゴシック" charset="-128"/>
-              </a:rPr>
-              <a:t>Background</a:t>
-            </a:r>
-          </a:p>
-          <a:p>
-            <a:pPr lvl="1"/>
-            <a:r>
-              <a:rPr lang="en-US" altLang="x-none" dirty="0" smtClean="0">
-                <a:ea typeface="ＭＳ Ｐゴシック" charset="-128"/>
-              </a:rPr>
-              <a:t>Have a python script that needs to be run from the command line</a:t>
-            </a:r>
-          </a:p>
-          <a:p>
-            <a:pPr lvl="1"/>
-            <a:r>
-              <a:rPr lang="en-US" altLang="x-none" dirty="0" smtClean="0">
-                <a:ea typeface="ＭＳ Ｐゴシック" charset="-128"/>
-              </a:rPr>
-              <a:t>What python module should we use to handle command line arguments?</a:t>
-            </a:r>
-          </a:p>
-          <a:p>
-            <a:pPr lvl="2"/>
-            <a:r>
-              <a:rPr lang="en-US" altLang="x-none" dirty="0" smtClean="0">
-                <a:ea typeface="ＭＳ Ｐゴシック" charset="-128"/>
-              </a:rPr>
-              <a:t>Some options include</a:t>
-            </a:r>
-          </a:p>
-          <a:p>
-            <a:pPr lvl="3"/>
-            <a:r>
-              <a:rPr lang="en-US" altLang="x-none" dirty="0">
-                <a:ea typeface="ＭＳ Ｐゴシック" charset="-128"/>
-              </a:rPr>
-              <a:t>c</a:t>
-            </a:r>
-            <a:r>
-              <a:rPr lang="en-US" altLang="x-none" dirty="0" smtClean="0">
-                <a:ea typeface="ＭＳ Ｐゴシック" charset="-128"/>
-              </a:rPr>
-              <a:t>lick</a:t>
-            </a:r>
-          </a:p>
-          <a:p>
-            <a:pPr lvl="3"/>
-            <a:r>
-              <a:rPr lang="en-US" altLang="x-none" dirty="0" err="1" smtClean="0">
-                <a:ea typeface="ＭＳ Ｐゴシック" charset="-128"/>
-              </a:rPr>
-              <a:t>docopt</a:t>
-            </a:r>
-            <a:endParaRPr lang="en-US" altLang="x-none" dirty="0" smtClean="0">
-              <a:ea typeface="ＭＳ Ｐゴシック" charset="-128"/>
-            </a:endParaRPr>
-          </a:p>
-          <a:p>
-            <a:pPr lvl="3"/>
-            <a:r>
-              <a:rPr lang="en-US" altLang="x-none" dirty="0" err="1" smtClean="0">
-                <a:ea typeface="ＭＳ Ｐゴシック" charset="-128"/>
-              </a:rPr>
-              <a:t>argparse</a:t>
-            </a:r>
-            <a:endParaRPr lang="en-US" altLang="x-none" dirty="0">
-              <a:ea typeface="ＭＳ Ｐゴシック" charset="-128"/>
-            </a:endParaRPr>
-          </a:p>
-        </p:txBody>
-      </p:sp>
-      <p:sp>
-        <p:nvSpPr>
-          <p:cNvPr id="40963" name="Footer Placeholder 3"/>
-          <p:cNvSpPr>
-            <a:spLocks noGrp="1"/>
-          </p:cNvSpPr>
-          <p:nvPr>
-            <p:ph type="ftr" sz="quarter" idx="10"/>
-          </p:nvPr>
-        </p:nvSpPr>
-        <p:spPr bwMode="auto">
-          <a:noFill/>
-          <a:extLst>
-            <a:ext uri="{909E8E84-426E-40DD-AFC4-6F175D3DCCD1}">
-              <a14:hiddenFill xmlns:a14="http://schemas.microsoft.com/office/drawing/2010/main">
-                <a:solidFill>
-                  <a:srgbClr val="FFFFFF"/>
-                </a:solidFill>
-              </a14:hiddenFill>
-            </a:ext>
-            <a:ext uri="{91240B29-F687-4F45-9708-019B960494DF}">
-              <a14:hiddenLine xmlns:a14="http://schemas.microsoft.com/office/drawing/2010/main" w="9525">
-                <a:solidFill>
-                  <a:srgbClr val="000000"/>
-                </a:solidFill>
-                <a:miter lim="800000"/>
-                <a:headEnd/>
-                <a:tailEnd/>
-              </a14:hiddenLine>
-            </a:ext>
-          </a:extLst>
-        </p:spPr>
-        <p:txBody>
-          <a:bodyPr/>
-          <a:lstStyle>
-            <a:lvl1pPr>
-              <a:defRPr>
-                <a:solidFill>
-                  <a:schemeClr val="tx1"/>
-                </a:solidFill>
-                <a:latin typeface="Arial" charset="0"/>
-                <a:ea typeface="ＭＳ Ｐゴシック" charset="-128"/>
-              </a:defRPr>
-            </a:lvl1pPr>
-            <a:lvl2pPr marL="742950" indent="-285750">
-              <a:defRPr>
-                <a:solidFill>
-                  <a:schemeClr val="tx1"/>
-                </a:solidFill>
-                <a:latin typeface="Arial" charset="0"/>
-                <a:ea typeface="ＭＳ Ｐゴシック" charset="-128"/>
-              </a:defRPr>
-            </a:lvl2pPr>
-            <a:lvl3pPr marL="1143000" indent="-228600">
-              <a:defRPr>
-                <a:solidFill>
-                  <a:schemeClr val="tx1"/>
-                </a:solidFill>
-                <a:latin typeface="Arial" charset="0"/>
-                <a:ea typeface="ＭＳ Ｐゴシック" charset="-128"/>
-              </a:defRPr>
-            </a:lvl3pPr>
-            <a:lvl4pPr marL="1600200" indent="-228600">
-              <a:defRPr>
-                <a:solidFill>
-                  <a:schemeClr val="tx1"/>
-                </a:solidFill>
-                <a:latin typeface="Arial" charset="0"/>
-                <a:ea typeface="ＭＳ Ｐゴシック" charset="-128"/>
-              </a:defRPr>
-            </a:lvl4pPr>
-            <a:lvl5pPr marL="2057400" indent="-228600">
-              <a:defRPr>
-                <a:solidFill>
-                  <a:schemeClr val="tx1"/>
-                </a:solidFill>
-                <a:latin typeface="Arial" charset="0"/>
-                <a:ea typeface="ＭＳ Ｐゴシック" charset="-128"/>
-              </a:defRPr>
-            </a:lvl5pPr>
-            <a:lvl6pPr marL="2514600" indent="-228600" defTabSz="457200" eaLnBrk="0" fontAlgn="base" hangingPunct="0">
-              <a:spcBef>
-                <a:spcPct val="0"/>
-              </a:spcBef>
-              <a:spcAft>
-                <a:spcPct val="0"/>
-              </a:spcAft>
-              <a:defRPr>
-                <a:solidFill>
-                  <a:schemeClr val="tx1"/>
-                </a:solidFill>
-                <a:latin typeface="Arial" charset="0"/>
-                <a:ea typeface="ＭＳ Ｐゴシック" charset="-128"/>
-              </a:defRPr>
-            </a:lvl6pPr>
-            <a:lvl7pPr marL="2971800" indent="-228600" defTabSz="457200" eaLnBrk="0" fontAlgn="base" hangingPunct="0">
-              <a:spcBef>
-                <a:spcPct val="0"/>
-              </a:spcBef>
-              <a:spcAft>
-                <a:spcPct val="0"/>
-              </a:spcAft>
-              <a:defRPr>
-                <a:solidFill>
-                  <a:schemeClr val="tx1"/>
-                </a:solidFill>
-                <a:latin typeface="Arial" charset="0"/>
-                <a:ea typeface="ＭＳ Ｐゴシック" charset="-128"/>
-              </a:defRPr>
-            </a:lvl7pPr>
-            <a:lvl8pPr marL="3429000" indent="-228600" defTabSz="457200" eaLnBrk="0" fontAlgn="base" hangingPunct="0">
-              <a:spcBef>
-                <a:spcPct val="0"/>
-              </a:spcBef>
-              <a:spcAft>
-                <a:spcPct val="0"/>
-              </a:spcAft>
-              <a:defRPr>
-                <a:solidFill>
-                  <a:schemeClr val="tx1"/>
-                </a:solidFill>
-                <a:latin typeface="Arial" charset="0"/>
-                <a:ea typeface="ＭＳ Ｐゴシック" charset="-128"/>
-              </a:defRPr>
-            </a:lvl8pPr>
-            <a:lvl9pPr marL="3886200" indent="-228600" defTabSz="457200" eaLnBrk="0" fontAlgn="base" hangingPunct="0">
-              <a:spcBef>
-                <a:spcPct val="0"/>
-              </a:spcBef>
-              <a:spcAft>
-                <a:spcPct val="0"/>
-              </a:spcAft>
-              <a:defRPr>
-                <a:solidFill>
-                  <a:schemeClr val="tx1"/>
-                </a:solidFill>
-                <a:latin typeface="Arial" charset="0"/>
-                <a:ea typeface="ＭＳ Ｐゴシック" charset="-128"/>
-              </a:defRPr>
-            </a:lvl9pPr>
-          </a:lstStyle>
-          <a:p>
-            <a:r>
-              <a:rPr lang="en-US" altLang="x-none" dirty="0" smtClean="0">
-                <a:solidFill>
-                  <a:srgbClr val="898989"/>
-                </a:solidFill>
-                <a:latin typeface="Calibri" charset="0"/>
-              </a:rPr>
-              <a:t>Beck, </a:t>
-            </a:r>
-            <a:r>
-              <a:rPr lang="en-US" altLang="x-none" dirty="0" err="1" smtClean="0">
-                <a:solidFill>
-                  <a:srgbClr val="898989"/>
-                </a:solidFill>
-                <a:latin typeface="Calibri" charset="0"/>
-              </a:rPr>
-              <a:t>Hellerstein</a:t>
-            </a:r>
-            <a:r>
-              <a:rPr lang="en-US" altLang="x-none" dirty="0" smtClean="0">
-                <a:solidFill>
-                  <a:srgbClr val="898989"/>
-                </a:solidFill>
-                <a:latin typeface="Calibri" charset="0"/>
-              </a:rPr>
-              <a:t> &amp; </a:t>
-            </a:r>
-            <a:r>
-              <a:rPr lang="en-US" altLang="x-none" dirty="0" err="1" smtClean="0">
-                <a:solidFill>
-                  <a:srgbClr val="898989"/>
-                </a:solidFill>
-                <a:latin typeface="Calibri" charset="0"/>
-              </a:rPr>
-              <a:t>VanderPlas</a:t>
-            </a:r>
-            <a:r>
-              <a:rPr lang="en-US" altLang="x-none" dirty="0" smtClean="0">
-                <a:solidFill>
-                  <a:srgbClr val="898989"/>
-                </a:solidFill>
-                <a:latin typeface="Calibri" charset="0"/>
-              </a:rPr>
-              <a:t>, 2018</a:t>
-            </a:r>
-            <a:endParaRPr lang="en-US" altLang="x-none" dirty="0">
-              <a:solidFill>
-                <a:srgbClr val="898989"/>
-              </a:solidFill>
-              <a:latin typeface="Calibri" charset="0"/>
-            </a:endParaRPr>
-          </a:p>
-        </p:txBody>
-      </p:sp>
-    </p:spTree>
-  </p:cSld>
-  <p:clrMapOvr>
-    <a:masterClrMapping/>
-  </p:clrMapOvr>
-  <p:timing>
-    <p:tnLst>
-      <p:par>
-        <p:cTn id="1" dur="indefinite" restart="never" nodeType="tmRoot"/>
-      </p:par>
-    </p:tnLst>
-  </p:timing>
-</p:sld>
-</file>
-
 <file path=ppt/slides/slide15.xml><?xml version="1.0" encoding="utf-8"?>
 <p:sld xmlns:a="http://schemas.openxmlformats.org/drawingml/2006/main" xmlns:r="http://schemas.openxmlformats.org/officeDocument/2006/relationships" xmlns:p="http://schemas.openxmlformats.org/presentationml/2006/main">
   <p:cSld>
@@ -9572,126 +9647,77 @@
           </a:bodyPr>
           <a:lstStyle/>
           <a:p>
-            <a:pPr marL="0" indent="0">
-              <a:buNone/>
-            </a:pPr>
-            <a:r>
-              <a:rPr lang="en-US" sz="1400" dirty="0">
-                <a:solidFill>
-                  <a:schemeClr val="bg1">
-                    <a:lumMod val="65000"/>
-                  </a:schemeClr>
-                </a:solidFill>
-              </a:rPr>
-              <a:t>[dacb@D-108-179-129-50 ~/</a:t>
-            </a:r>
-            <a:r>
-              <a:rPr lang="en-US" sz="1400" dirty="0" err="1" smtClean="0">
-                <a:solidFill>
-                  <a:schemeClr val="bg1">
-                    <a:lumMod val="65000"/>
-                  </a:schemeClr>
-                </a:solidFill>
-              </a:rPr>
-              <a:t>tmp</a:t>
-            </a:r>
-            <a:r>
-              <a:rPr lang="en-US" sz="1400" dirty="0" smtClean="0">
-                <a:solidFill>
-                  <a:schemeClr val="bg1">
-                    <a:lumMod val="65000"/>
-                  </a:schemeClr>
-                </a:solidFill>
-              </a:rPr>
-              <a:t>]$</a:t>
-            </a:r>
-            <a:r>
-              <a:rPr lang="en-US" sz="1400" dirty="0" smtClean="0"/>
-              <a:t> ./</a:t>
-            </a:r>
-            <a:r>
-              <a:rPr lang="en-US" sz="1400" dirty="0" err="1" smtClean="0"/>
-              <a:t>solver.py</a:t>
-            </a:r>
-            <a:r>
-              <a:rPr lang="en-US" sz="1400" dirty="0"/>
-              <a:t> </a:t>
-            </a:r>
-          </a:p>
-          <a:p>
-            <a:pPr marL="0" indent="0">
-              <a:buNone/>
-            </a:pPr>
-            <a:r>
-              <a:rPr lang="en-US" sz="1400" dirty="0">
-                <a:solidFill>
-                  <a:srgbClr val="C00000"/>
-                </a:solidFill>
-              </a:rPr>
-              <a:t>usage: </a:t>
-            </a:r>
-            <a:r>
-              <a:rPr lang="en-US" sz="1400" dirty="0" err="1">
-                <a:solidFill>
-                  <a:srgbClr val="C00000"/>
-                </a:solidFill>
-              </a:rPr>
-              <a:t>solver.py</a:t>
-            </a:r>
-            <a:r>
-              <a:rPr lang="en-US" sz="1400" dirty="0">
-                <a:solidFill>
-                  <a:srgbClr val="C00000"/>
-                </a:solidFill>
-              </a:rPr>
-              <a:t> [-h] -C PLIGC -H PLIGH -O PLIGO [-t TEMPERATURE]</a:t>
-            </a:r>
-          </a:p>
-          <a:p>
-            <a:pPr marL="0" indent="0">
-              <a:buNone/>
-            </a:pPr>
-            <a:r>
-              <a:rPr lang="en-US" sz="1400" dirty="0">
-                <a:solidFill>
-                  <a:srgbClr val="C00000"/>
-                </a:solidFill>
-              </a:rPr>
-              <a:t>                 [-m MAX_TEMPERATURE] [-r HEATING_RATE] [-s STOP_TIME]</a:t>
-            </a:r>
-          </a:p>
-          <a:p>
-            <a:pPr marL="0" indent="0">
-              <a:buNone/>
-            </a:pPr>
-            <a:r>
-              <a:rPr lang="en-US" sz="1400" dirty="0" err="1">
-                <a:solidFill>
-                  <a:srgbClr val="C00000"/>
-                </a:solidFill>
-              </a:rPr>
-              <a:t>solver.py</a:t>
-            </a:r>
-            <a:r>
-              <a:rPr lang="en-US" sz="1400" dirty="0">
-                <a:solidFill>
-                  <a:srgbClr val="C00000"/>
-                </a:solidFill>
-              </a:rPr>
-              <a:t>: error: the following arguments are required: -C/--PLIGC, -H/--PLIGH, -O/--</a:t>
-            </a:r>
-            <a:r>
-              <a:rPr lang="en-US" sz="1400" dirty="0" smtClean="0">
-                <a:solidFill>
-                  <a:srgbClr val="C00000"/>
-                </a:solidFill>
-              </a:rPr>
-              <a:t>PLIGO</a:t>
-            </a:r>
-            <a:endParaRPr lang="en-US" sz="1400" dirty="0">
-              <a:solidFill>
-                <a:srgbClr val="C00000"/>
-              </a:solidFill>
+            <a:r>
+              <a:rPr lang="en-US" altLang="x-none" dirty="0">
+                <a:ea typeface="ＭＳ Ｐゴシック" charset="-128"/>
+              </a:rPr>
+              <a:t>Background</a:t>
+            </a:r>
+          </a:p>
+          <a:p>
+            <a:pPr lvl="1"/>
+            <a:r>
+              <a:rPr lang="en-US" altLang="x-none" dirty="0" smtClean="0">
+                <a:ea typeface="ＭＳ Ｐゴシック" charset="-128"/>
+              </a:rPr>
+              <a:t>Have a python script that needs to be run from the command line</a:t>
+            </a:r>
+          </a:p>
+          <a:p>
+            <a:pPr lvl="1"/>
+            <a:r>
+              <a:rPr lang="en-US" altLang="x-none" dirty="0" smtClean="0">
+                <a:ea typeface="ＭＳ Ｐゴシック" charset="-128"/>
+              </a:rPr>
+              <a:t>What python module should we use to handle command line arguments?</a:t>
+            </a:r>
+          </a:p>
+          <a:p>
+            <a:pPr lvl="2"/>
+            <a:r>
+              <a:rPr lang="en-US" altLang="x-none" dirty="0" smtClean="0">
+                <a:ea typeface="ＭＳ Ｐゴシック" charset="-128"/>
+              </a:rPr>
+              <a:t>Some options include</a:t>
+            </a:r>
+          </a:p>
+          <a:p>
+            <a:pPr lvl="3"/>
+            <a:r>
+              <a:rPr lang="en-US" altLang="x-none" dirty="0">
+                <a:ea typeface="ＭＳ Ｐゴシック" charset="-128"/>
+              </a:rPr>
+              <a:t>c</a:t>
+            </a:r>
+            <a:r>
+              <a:rPr lang="en-US" altLang="x-none" dirty="0" smtClean="0">
+                <a:ea typeface="ＭＳ Ｐゴシック" charset="-128"/>
+              </a:rPr>
+              <a:t>lick</a:t>
+            </a:r>
+          </a:p>
+          <a:p>
+            <a:pPr lvl="3"/>
+            <a:r>
+              <a:rPr lang="en-US" altLang="x-none" dirty="0" err="1" smtClean="0">
+                <a:ea typeface="ＭＳ Ｐゴシック" charset="-128"/>
+              </a:rPr>
+              <a:t>docopt</a:t>
+            </a:r>
+            <a:endParaRPr lang="en-US" altLang="x-none" dirty="0" smtClean="0">
+              <a:ea typeface="ＭＳ Ｐゴシック" charset="-128"/>
+            </a:endParaRPr>
+          </a:p>
+          <a:p>
+            <a:pPr lvl="3"/>
+            <a:r>
+              <a:rPr lang="en-US" altLang="x-none" dirty="0" err="1" smtClean="0">
+                <a:ea typeface="ＭＳ Ｐゴシック" charset="-128"/>
+              </a:rPr>
+              <a:t>argparse</a:t>
+            </a:r>
+            <a:endParaRPr lang="en-US" altLang="x-none" dirty="0">
+              <a:ea typeface="ＭＳ Ｐゴシック" charset="-128"/>
             </a:endParaRPr>
           </a:p>
         </p:txBody>
@@ -9893,11 +9919,6 @@
         </p:txBody>
       </p:sp>
     </p:spTree>
-    <p:extLst>
-      <p:ext uri="{BB962C8B-B14F-4D97-AF65-F5344CB8AC3E}">
-        <p14:creationId xmlns:p14="http://schemas.microsoft.com/office/powerpoint/2010/main" val="96395590"/>
-      </p:ext>
-    </p:extLst>
   </p:cSld>
   <p:clrMapOvr>
     <a:masterClrMapping/>
@@ -10044,56 +10065,46 @@
               <a:buNone/>
             </a:pPr>
             <a:r>
+              <a:rPr lang="en-US" sz="1400" dirty="0">
+                <a:solidFill>
+                  <a:schemeClr val="bg1">
+                    <a:lumMod val="65000"/>
+                  </a:schemeClr>
+                </a:solidFill>
+              </a:rPr>
+              <a:t>[dacb@D-108-179-129-50 ~/</a:t>
+            </a:r>
+            <a:r>
+              <a:rPr lang="en-US" sz="1400" dirty="0" err="1" smtClean="0">
+                <a:solidFill>
+                  <a:schemeClr val="bg1">
+                    <a:lumMod val="65000"/>
+                  </a:schemeClr>
+                </a:solidFill>
+              </a:rPr>
+              <a:t>tmp</a:t>
+            </a:r>
+            <a:r>
               <a:rPr lang="en-US" sz="1400" dirty="0" smtClean="0">
                 <a:solidFill>
                   <a:schemeClr val="bg1">
-                    <a:lumMod val="75000"/>
+                    <a:lumMod val="65000"/>
                   </a:schemeClr>
                 </a:solidFill>
               </a:rPr>
-              <a:t>[</a:t>
-            </a:r>
-            <a:r>
-              <a:rPr lang="en-US" sz="1400" dirty="0">
-                <a:solidFill>
-                  <a:schemeClr val="bg1">
-                    <a:lumMod val="75000"/>
-                  </a:schemeClr>
-                </a:solidFill>
-              </a:rPr>
-              <a:t>dacb@D-108-179-129-50 ~/</a:t>
-            </a:r>
-            <a:r>
-              <a:rPr lang="en-US" sz="1400" dirty="0" err="1">
-                <a:solidFill>
-                  <a:schemeClr val="bg1">
-                    <a:lumMod val="75000"/>
-                  </a:schemeClr>
-                </a:solidFill>
-              </a:rPr>
-              <a:t>tmp</a:t>
-            </a:r>
-            <a:r>
-              <a:rPr lang="en-US" sz="1400" dirty="0">
-                <a:solidFill>
-                  <a:schemeClr val="bg1">
-                    <a:lumMod val="75000"/>
-                  </a:schemeClr>
-                </a:solidFill>
-              </a:rPr>
-              <a:t>]$ </a:t>
+              <a:t>]$</a:t>
+            </a:r>
+            <a:r>
+              <a:rPr lang="en-US" sz="1400" dirty="0" smtClean="0"/>
+              <a:t> ./</a:t>
+            </a:r>
+            <a:r>
+              <a:rPr lang="en-US" sz="1400" dirty="0" err="1" smtClean="0"/>
+              <a:t>solver.py</a:t>
             </a:r>
             <a:r>
               <a:rPr lang="en-US" sz="1400" dirty="0"/>
-              <a:t>./</a:t>
-            </a:r>
-            <a:r>
-              <a:rPr lang="en-US" sz="1400" dirty="0" err="1"/>
-              <a:t>solver.py</a:t>
-            </a:r>
-            <a:r>
-              <a:rPr lang="en-US" sz="1400" dirty="0"/>
-              <a:t> -h</a:t>
+              <a:t> </a:t>
             </a:r>
           </a:p>
           <a:p>
@@ -10135,7 +10146,28 @@
                   <a:srgbClr val="C00000"/>
                 </a:solidFill>
               </a:rPr>
-              <a:t>                 [-m MAX_TEMPERATURE] [-r HEATING_RATE] [-s STOP_TIME</a:t>
+              <a:t>                 [-m MAX_TEMPERATURE] [-r HEATING_RATE] [-s STOP_TIME]</a:t>
+            </a:r>
+          </a:p>
+          <a:p>
+            <a:pPr marL="0" indent="0">
+              <a:buNone/>
+            </a:pPr>
+            <a:r>
+              <a:rPr lang="en-US" sz="1400" dirty="0" err="1">
+                <a:solidFill>
+                  <a:srgbClr val="C00000"/>
+                </a:solidFill>
+              </a:rPr>
+              <a:t>solver.py</a:t>
+            </a:r>
+            <a:r>
+              <a:rPr lang="en-US" sz="1400" dirty="0">
+                <a:solidFill>
+                  <a:srgbClr val="C00000"/>
+                </a:solidFill>
+              </a:rPr>
+              <a:t>: error: the following arguments are required: -C/--PLIGC, -H/--PLIGH, -O/--</a:t>
             </a:r>
             <a:r>
               <a:rPr lang="en-US" sz="1400" dirty="0" smtClean="0">
@@ -10143,324 +10175,12 @@
                   <a:srgbClr val="C00000"/>
                 </a:solidFill>
               </a:rPr>
-              <a:t>]</a:t>
+              <a:t>PLIGO</a:t>
             </a:r>
             <a:endParaRPr lang="en-US" sz="1400" dirty="0">
               <a:solidFill>
                 <a:srgbClr val="C00000"/>
               </a:solidFill>
-            </a:endParaRPr>
-          </a:p>
-          <a:p>
-            <a:pPr marL="0" indent="0">
-              <a:buNone/>
-            </a:pPr>
-            <a:r>
-              <a:rPr lang="en-US" sz="1400" dirty="0">
-                <a:solidFill>
-                  <a:srgbClr val="C00000"/>
-                </a:solidFill>
-              </a:rPr>
-              <a:t>optional arguments:</a:t>
-            </a:r>
-          </a:p>
-          <a:p>
-            <a:pPr marL="0" indent="0">
-              <a:buNone/>
-            </a:pPr>
-            <a:r>
-              <a:rPr lang="en-US" sz="1400" dirty="0">
-                <a:solidFill>
-                  <a:srgbClr val="C00000"/>
-                </a:solidFill>
-              </a:rPr>
-              <a:t>  -h, --help            show this help message and exit</a:t>
-            </a:r>
-          </a:p>
-          <a:p>
-            <a:pPr marL="0" indent="0">
-              <a:buNone/>
-            </a:pPr>
-            <a:r>
-              <a:rPr lang="en-US" sz="1400" dirty="0">
-                <a:solidFill>
-                  <a:srgbClr val="C00000"/>
-                </a:solidFill>
-              </a:rPr>
-              <a:t>  -C PLIGC, --PLIGC PLIGC</a:t>
-            </a:r>
-          </a:p>
-          <a:p>
-            <a:pPr marL="0" indent="0">
-              <a:buNone/>
-            </a:pPr>
-            <a:r>
-              <a:rPr lang="en-US" sz="1400" dirty="0">
-                <a:solidFill>
-                  <a:srgbClr val="C00000"/>
-                </a:solidFill>
-              </a:rPr>
-              <a:t>                        </a:t>
-            </a:r>
-            <a:r>
-              <a:rPr lang="en-US" sz="1400" dirty="0" err="1">
-                <a:solidFill>
-                  <a:srgbClr val="C00000"/>
-                </a:solidFill>
-              </a:rPr>
-              <a:t>mol</a:t>
-            </a:r>
-            <a:r>
-              <a:rPr lang="en-US" sz="1400" dirty="0">
-                <a:solidFill>
-                  <a:srgbClr val="C00000"/>
-                </a:solidFill>
-              </a:rPr>
-              <a:t> number of C in input</a:t>
-            </a:r>
-          </a:p>
-          <a:p>
-            <a:pPr marL="0" indent="0">
-              <a:buNone/>
-            </a:pPr>
-            <a:r>
-              <a:rPr lang="en-US" sz="1400" dirty="0">
-                <a:solidFill>
-                  <a:srgbClr val="C00000"/>
-                </a:solidFill>
-              </a:rPr>
-              <a:t>  -H PLIGH, --PLIGH PLIGH</a:t>
-            </a:r>
-          </a:p>
-          <a:p>
-            <a:pPr marL="0" indent="0">
-              <a:buNone/>
-            </a:pPr>
-            <a:r>
-              <a:rPr lang="en-US" sz="1400" dirty="0">
-                <a:solidFill>
-                  <a:srgbClr val="C00000"/>
-                </a:solidFill>
-              </a:rPr>
-              <a:t>                        </a:t>
-            </a:r>
-            <a:r>
-              <a:rPr lang="en-US" sz="1400" dirty="0" err="1">
-                <a:solidFill>
-                  <a:srgbClr val="C00000"/>
-                </a:solidFill>
-              </a:rPr>
-              <a:t>mol</a:t>
-            </a:r>
-            <a:r>
-              <a:rPr lang="en-US" sz="1400" dirty="0">
-                <a:solidFill>
-                  <a:srgbClr val="C00000"/>
-                </a:solidFill>
-              </a:rPr>
-              <a:t> number of H in input</a:t>
-            </a:r>
-          </a:p>
-          <a:p>
-            <a:pPr marL="0" indent="0">
-              <a:buNone/>
-            </a:pPr>
-            <a:r>
-              <a:rPr lang="en-US" sz="1400" dirty="0">
-                <a:solidFill>
-                  <a:srgbClr val="C00000"/>
-                </a:solidFill>
-              </a:rPr>
-              <a:t>  -O PLIGO, --PLIGO PLIGO</a:t>
-            </a:r>
-          </a:p>
-          <a:p>
-            <a:pPr marL="0" indent="0">
-              <a:buNone/>
-            </a:pPr>
-            <a:r>
-              <a:rPr lang="en-US" sz="1400" dirty="0">
-                <a:solidFill>
-                  <a:srgbClr val="C00000"/>
-                </a:solidFill>
-              </a:rPr>
-              <a:t>                        </a:t>
-            </a:r>
-            <a:r>
-              <a:rPr lang="en-US" sz="1400" dirty="0" err="1">
-                <a:solidFill>
-                  <a:srgbClr val="C00000"/>
-                </a:solidFill>
-              </a:rPr>
-              <a:t>mol</a:t>
-            </a:r>
-            <a:r>
-              <a:rPr lang="en-US" sz="1400" dirty="0">
-                <a:solidFill>
-                  <a:srgbClr val="C00000"/>
-                </a:solidFill>
-              </a:rPr>
-              <a:t> number of O in input</a:t>
-            </a:r>
-          </a:p>
-          <a:p>
-            <a:pPr marL="0" indent="0">
-              <a:buNone/>
-            </a:pPr>
-            <a:r>
-              <a:rPr lang="en-US" sz="1400" dirty="0">
-                <a:solidFill>
-                  <a:srgbClr val="C00000"/>
-                </a:solidFill>
-              </a:rPr>
-              <a:t>  -t TEMPERATURE, --temperature TEMPERATURE</a:t>
-            </a:r>
-          </a:p>
-          <a:p>
-            <a:pPr marL="0" indent="0">
-              <a:buNone/>
-            </a:pPr>
-            <a:r>
-              <a:rPr lang="en-US" sz="1400" dirty="0">
-                <a:solidFill>
-                  <a:srgbClr val="C00000"/>
-                </a:solidFill>
-              </a:rPr>
-              <a:t>                        starting temperature</a:t>
-            </a:r>
-          </a:p>
-          <a:p>
-            <a:pPr marL="0" indent="0">
-              <a:buNone/>
-            </a:pPr>
-            <a:r>
-              <a:rPr lang="en-US" sz="1400" dirty="0">
-                <a:solidFill>
-                  <a:srgbClr val="C00000"/>
-                </a:solidFill>
-              </a:rPr>
-              <a:t>  -m MAX_TEMPERATURE, --</a:t>
-            </a:r>
-            <a:r>
-              <a:rPr lang="en-US" sz="1400" dirty="0" err="1">
-                <a:solidFill>
-                  <a:srgbClr val="C00000"/>
-                </a:solidFill>
-              </a:rPr>
-              <a:t>max_temperature</a:t>
-            </a:r>
-            <a:r>
-              <a:rPr lang="en-US" sz="1400" dirty="0">
-                <a:solidFill>
-                  <a:srgbClr val="C00000"/>
-                </a:solidFill>
-              </a:rPr>
-              <a:t> MAX_TEMPERATURE</a:t>
-            </a:r>
-          </a:p>
-          <a:p>
-            <a:pPr marL="0" indent="0">
-              <a:buNone/>
-            </a:pPr>
-            <a:r>
-              <a:rPr lang="en-US" sz="1400" dirty="0">
-                <a:solidFill>
-                  <a:srgbClr val="C00000"/>
-                </a:solidFill>
-              </a:rPr>
-              <a:t>                        maximum pyrolysis temperature</a:t>
-            </a:r>
-          </a:p>
-          <a:p>
-            <a:pPr marL="0" indent="0">
-              <a:buNone/>
-            </a:pPr>
-            <a:r>
-              <a:rPr lang="en-US" sz="1400" dirty="0">
-                <a:solidFill>
-                  <a:srgbClr val="C00000"/>
-                </a:solidFill>
-              </a:rPr>
-              <a:t>  -r HEATING_RATE, --</a:t>
-            </a:r>
-            <a:r>
-              <a:rPr lang="en-US" sz="1400" dirty="0" err="1">
-                <a:solidFill>
-                  <a:srgbClr val="C00000"/>
-                </a:solidFill>
-              </a:rPr>
-              <a:t>heating_rate</a:t>
-            </a:r>
-            <a:r>
-              <a:rPr lang="en-US" sz="1400" dirty="0">
-                <a:solidFill>
-                  <a:srgbClr val="C00000"/>
-                </a:solidFill>
-              </a:rPr>
-              <a:t> HEATING_RATE</a:t>
-            </a:r>
-          </a:p>
-          <a:p>
-            <a:pPr marL="0" indent="0">
-              <a:buNone/>
-            </a:pPr>
-            <a:r>
-              <a:rPr lang="en-US" sz="1400" dirty="0">
-                <a:solidFill>
-                  <a:srgbClr val="C00000"/>
-                </a:solidFill>
-              </a:rPr>
-              <a:t>                        heating rate in K/s</a:t>
-            </a:r>
-          </a:p>
-          <a:p>
-            <a:pPr marL="0" indent="0">
-              <a:buNone/>
-            </a:pPr>
-            <a:r>
-              <a:rPr lang="en-US" sz="1400" dirty="0">
-                <a:solidFill>
-                  <a:srgbClr val="C00000"/>
-                </a:solidFill>
-              </a:rPr>
-              <a:t>  -s STOP_TIME, --</a:t>
-            </a:r>
-            <a:r>
-              <a:rPr lang="en-US" sz="1400" dirty="0" err="1">
-                <a:solidFill>
-                  <a:srgbClr val="C00000"/>
-                </a:solidFill>
-              </a:rPr>
-              <a:t>stop_time</a:t>
-            </a:r>
-            <a:r>
-              <a:rPr lang="en-US" sz="1400" dirty="0">
-                <a:solidFill>
-                  <a:srgbClr val="C00000"/>
-                </a:solidFill>
-              </a:rPr>
-              <a:t> STOP_TIME</a:t>
-            </a:r>
-          </a:p>
-          <a:p>
-            <a:pPr marL="0" indent="0">
-              <a:buNone/>
-            </a:pPr>
-            <a:r>
-              <a:rPr lang="en-US" sz="1400" dirty="0">
-                <a:solidFill>
-                  <a:srgbClr val="C00000"/>
-                </a:solidFill>
-              </a:rPr>
-              <a:t>                        stop time in seconds</a:t>
-            </a:r>
-          </a:p>
-          <a:p>
-            <a:pPr marL="0" indent="0">
-              <a:buNone/>
-            </a:pPr>
-            <a:endParaRPr lang="en-US" altLang="x-none" sz="1400" dirty="0">
-              <a:ea typeface="ＭＳ Ｐゴシック" charset="-128"/>
             </a:endParaRPr>
           </a:p>
         </p:txBody>
@@ -10664,7 +10384,7 @@
     </p:spTree>
     <p:extLst>
       <p:ext uri="{BB962C8B-B14F-4D97-AF65-F5344CB8AC3E}">
-        <p14:creationId xmlns:p14="http://schemas.microsoft.com/office/powerpoint/2010/main" val="55535477"/>
+        <p14:creationId xmlns:p14="http://schemas.microsoft.com/office/powerpoint/2010/main" val="96395590"/>
       </p:ext>
     </p:extLst>
   </p:cSld>
@@ -10813,37 +10533,47 @@
               <a:buNone/>
             </a:pPr>
             <a:r>
-              <a:rPr lang="en-US" sz="1400" dirty="0">
+              <a:rPr lang="en-US" sz="1400" dirty="0" smtClean="0">
                 <a:solidFill>
                   <a:schemeClr val="bg1">
                     <a:lumMod val="75000"/>
                   </a:schemeClr>
                 </a:solidFill>
               </a:rPr>
-              <a:t>[dacb@D-108-179-129-50 ~/</a:t>
-            </a:r>
-            <a:r>
-              <a:rPr lang="en-US" sz="1400" dirty="0" err="1">
+              <a:t>[</a:t>
+            </a:r>
+            <a:r>
+              <a:rPr lang="en-US" sz="1400" dirty="0">
                 <a:solidFill>
                   <a:schemeClr val="bg1">
                     <a:lumMod val="75000"/>
                   </a:schemeClr>
                 </a:solidFill>
               </a:rPr>
-              <a:t>tmp</a:t>
-            </a:r>
-            <a:r>
-              <a:rPr lang="en-US" sz="1400" dirty="0" smtClean="0">
+              <a:t>dacb@D-108-179-129-50 ~/</a:t>
+            </a:r>
+            <a:r>
+              <a:rPr lang="en-US" sz="1400" dirty="0" err="1">
                 <a:solidFill>
                   <a:schemeClr val="bg1">
                     <a:lumMod val="75000"/>
                   </a:schemeClr>
                 </a:solidFill>
               </a:rPr>
+              <a:t>tmp</a:t>
+            </a:r>
+            <a:r>
+              <a:rPr lang="en-US" sz="1400" dirty="0">
+                <a:solidFill>
+                  <a:schemeClr val="bg1">
+                    <a:lumMod val="75000"/>
+                  </a:schemeClr>
+                </a:solidFill>
+              </a:rPr>
               <a:t>]$ </a:t>
             </a:r>
             <a:r>
-              <a:rPr lang="en-US" sz="1400" dirty="0" smtClean="0"/>
+              <a:rPr lang="en-US" sz="1400" dirty="0"/>
               <a:t>./</a:t>
             </a:r>
             <a:r>
@@ -10852,7 +10582,7 @@
             </a:r>
             <a:r>
               <a:rPr lang="en-US" sz="1400" dirty="0"/>
-              <a:t> --PLIGC 1.444234 --PLIGH 0.442 --PLIGO 0.320500 --temperature 325.0</a:t>
+              <a:t> -h</a:t>
             </a:r>
           </a:p>
           <a:p>
@@ -10865,7 +10595,23 @@
                   <a:srgbClr val="C00000"/>
                 </a:solidFill>
               </a:rPr>
-              <a:t>Solver arguments are:</a:t>
+              <a:t>usage: </a:t>
+            </a:r>
+            <a:r>
+              <a:rPr lang="en-US" sz="1400" dirty="0" err="1">
+                <a:solidFill>
+                  <a:srgbClr val="C00000"/>
+                </a:solidFill>
+              </a:rPr>
+              <a:t>solver.py</a:t>
+            </a:r>
+            <a:r>
+              <a:rPr lang="en-US" sz="1400" dirty="0">
+                <a:solidFill>
+                  <a:srgbClr val="C00000"/>
+                </a:solidFill>
+              </a:rPr>
+              <a:t> [-h] -C PLIGC -H PLIGH -O PLIGO [-t TEMPERATURE]</a:t>
             </a:r>
           </a:p>
           <a:p>
@@ -10873,20 +10619,755 @@
               <a:buNone/>
             </a:pPr>
             <a:r>
+              <a:rPr lang="en-US" sz="1400" dirty="0">
+                <a:solidFill>
+                  <a:srgbClr val="C00000"/>
+                </a:solidFill>
+              </a:rPr>
+              <a:t>                 [-m MAX_TEMPERATURE] [-r HEATING_RATE] [-s STOP_TIME</a:t>
+            </a:r>
+            <a:r>
               <a:rPr lang="en-US" sz="1400" dirty="0" smtClean="0">
                 <a:solidFill>
                   <a:srgbClr val="C00000"/>
                 </a:solidFill>
               </a:rPr>
-              <a:t>	PLIGC</a:t>
-            </a:r>
-            <a:r>
-              <a:rPr lang="en-US" sz="1400" smtClean="0">
+              <a:t>]</a:t>
+            </a:r>
+            <a:endParaRPr lang="en-US" sz="1400" dirty="0">
+              <a:solidFill>
+                <a:srgbClr val="C00000"/>
+              </a:solidFill>
+            </a:endParaRPr>
+          </a:p>
+          <a:p>
+            <a:pPr marL="0" indent="0">
+              <a:buNone/>
+            </a:pPr>
+            <a:r>
+              <a:rPr lang="en-US" sz="1400" dirty="0">
                 <a:solidFill>
                   <a:srgbClr val="C00000"/>
                 </a:solidFill>
               </a:rPr>
-              <a:t>	= 1.444234</a:t>
+              <a:t>optional arguments:</a:t>
+            </a:r>
+          </a:p>
+          <a:p>
+            <a:pPr marL="0" indent="0">
+              <a:buNone/>
+            </a:pPr>
+            <a:r>
+              <a:rPr lang="en-US" sz="1400" dirty="0">
+                <a:solidFill>
+                  <a:srgbClr val="C00000"/>
+                </a:solidFill>
+              </a:rPr>
+              <a:t>  -h, --help            show this help message and exit</a:t>
+            </a:r>
+          </a:p>
+          <a:p>
+            <a:pPr marL="0" indent="0">
+              <a:buNone/>
+            </a:pPr>
+            <a:r>
+              <a:rPr lang="en-US" sz="1400" dirty="0">
+                <a:solidFill>
+                  <a:srgbClr val="C00000"/>
+                </a:solidFill>
+              </a:rPr>
+              <a:t>  -C PLIGC, --PLIGC PLIGC</a:t>
+            </a:r>
+          </a:p>
+          <a:p>
+            <a:pPr marL="0" indent="0">
+              <a:buNone/>
+            </a:pPr>
+            <a:r>
+              <a:rPr lang="en-US" sz="1400" dirty="0">
+                <a:solidFill>
+                  <a:srgbClr val="C00000"/>
+                </a:solidFill>
+              </a:rPr>
+              <a:t>                        </a:t>
+            </a:r>
+            <a:r>
+              <a:rPr lang="en-US" sz="1400" dirty="0" err="1">
+                <a:solidFill>
+                  <a:srgbClr val="C00000"/>
+                </a:solidFill>
+              </a:rPr>
+              <a:t>mol</a:t>
+            </a:r>
+            <a:r>
+              <a:rPr lang="en-US" sz="1400" dirty="0">
+                <a:solidFill>
+                  <a:srgbClr val="C00000"/>
+                </a:solidFill>
+              </a:rPr>
+              <a:t> number of C in input</a:t>
+            </a:r>
+          </a:p>
+          <a:p>
+            <a:pPr marL="0" indent="0">
+              <a:buNone/>
+            </a:pPr>
+            <a:r>
+              <a:rPr lang="en-US" sz="1400" dirty="0">
+                <a:solidFill>
+                  <a:srgbClr val="C00000"/>
+                </a:solidFill>
+              </a:rPr>
+              <a:t>  -H PLIGH, --PLIGH PLIGH</a:t>
+            </a:r>
+          </a:p>
+          <a:p>
+            <a:pPr marL="0" indent="0">
+              <a:buNone/>
+            </a:pPr>
+            <a:r>
+              <a:rPr lang="en-US" sz="1400" dirty="0">
+                <a:solidFill>
+                  <a:srgbClr val="C00000"/>
+                </a:solidFill>
+              </a:rPr>
+              <a:t>                        </a:t>
+            </a:r>
+            <a:r>
+              <a:rPr lang="en-US" sz="1400" dirty="0" err="1">
+                <a:solidFill>
+                  <a:srgbClr val="C00000"/>
+                </a:solidFill>
+              </a:rPr>
+              <a:t>mol</a:t>
+            </a:r>
+            <a:r>
+              <a:rPr lang="en-US" sz="1400" dirty="0">
+                <a:solidFill>
+                  <a:srgbClr val="C00000"/>
+                </a:solidFill>
+              </a:rPr>
+              <a:t> number of H in input</a:t>
+            </a:r>
+          </a:p>
+          <a:p>
+            <a:pPr marL="0" indent="0">
+              <a:buNone/>
+            </a:pPr>
+            <a:r>
+              <a:rPr lang="en-US" sz="1400" dirty="0">
+                <a:solidFill>
+                  <a:srgbClr val="C00000"/>
+                </a:solidFill>
+              </a:rPr>
+              <a:t>  -O PLIGO, --PLIGO PLIGO</a:t>
+            </a:r>
+          </a:p>
+          <a:p>
+            <a:pPr marL="0" indent="0">
+              <a:buNone/>
+            </a:pPr>
+            <a:r>
+              <a:rPr lang="en-US" sz="1400" dirty="0">
+                <a:solidFill>
+                  <a:srgbClr val="C00000"/>
+                </a:solidFill>
+              </a:rPr>
+              <a:t>                        </a:t>
+            </a:r>
+            <a:r>
+              <a:rPr lang="en-US" sz="1400" dirty="0" err="1">
+                <a:solidFill>
+                  <a:srgbClr val="C00000"/>
+                </a:solidFill>
+              </a:rPr>
+              <a:t>mol</a:t>
+            </a:r>
+            <a:r>
+              <a:rPr lang="en-US" sz="1400" dirty="0">
+                <a:solidFill>
+                  <a:srgbClr val="C00000"/>
+                </a:solidFill>
+              </a:rPr>
+              <a:t> number of O in input</a:t>
+            </a:r>
+          </a:p>
+          <a:p>
+            <a:pPr marL="0" indent="0">
+              <a:buNone/>
+            </a:pPr>
+            <a:r>
+              <a:rPr lang="en-US" sz="1400" dirty="0">
+                <a:solidFill>
+                  <a:srgbClr val="C00000"/>
+                </a:solidFill>
+              </a:rPr>
+              <a:t>  -t TEMPERATURE, --temperature TEMPERATURE</a:t>
+            </a:r>
+          </a:p>
+          <a:p>
+            <a:pPr marL="0" indent="0">
+              <a:buNone/>
+            </a:pPr>
+            <a:r>
+              <a:rPr lang="en-US" sz="1400" dirty="0">
+                <a:solidFill>
+                  <a:srgbClr val="C00000"/>
+                </a:solidFill>
+              </a:rPr>
+              <a:t>                        starting temperature</a:t>
+            </a:r>
+          </a:p>
+          <a:p>
+            <a:pPr marL="0" indent="0">
+              <a:buNone/>
+            </a:pPr>
+            <a:r>
+              <a:rPr lang="en-US" sz="1400" dirty="0">
+                <a:solidFill>
+                  <a:srgbClr val="C00000"/>
+                </a:solidFill>
+              </a:rPr>
+              <a:t>  -m MAX_TEMPERATURE, --</a:t>
+            </a:r>
+            <a:r>
+              <a:rPr lang="en-US" sz="1400" dirty="0" err="1">
+                <a:solidFill>
+                  <a:srgbClr val="C00000"/>
+                </a:solidFill>
+              </a:rPr>
+              <a:t>max_temperature</a:t>
+            </a:r>
+            <a:r>
+              <a:rPr lang="en-US" sz="1400" dirty="0">
+                <a:solidFill>
+                  <a:srgbClr val="C00000"/>
+                </a:solidFill>
+              </a:rPr>
+              <a:t> MAX_TEMPERATURE</a:t>
+            </a:r>
+          </a:p>
+          <a:p>
+            <a:pPr marL="0" indent="0">
+              <a:buNone/>
+            </a:pPr>
+            <a:r>
+              <a:rPr lang="en-US" sz="1400" dirty="0">
+                <a:solidFill>
+                  <a:srgbClr val="C00000"/>
+                </a:solidFill>
+              </a:rPr>
+              <a:t>                        maximum pyrolysis temperature</a:t>
+            </a:r>
+          </a:p>
+          <a:p>
+            <a:pPr marL="0" indent="0">
+              <a:buNone/>
+            </a:pPr>
+            <a:r>
+              <a:rPr lang="en-US" sz="1400" dirty="0">
+                <a:solidFill>
+                  <a:srgbClr val="C00000"/>
+                </a:solidFill>
+              </a:rPr>
+              <a:t>  -r HEATING_RATE, --</a:t>
+            </a:r>
+            <a:r>
+              <a:rPr lang="en-US" sz="1400" dirty="0" err="1">
+                <a:solidFill>
+                  <a:srgbClr val="C00000"/>
+                </a:solidFill>
+              </a:rPr>
+              <a:t>heating_rate</a:t>
+            </a:r>
+            <a:r>
+              <a:rPr lang="en-US" sz="1400" dirty="0">
+                <a:solidFill>
+                  <a:srgbClr val="C00000"/>
+                </a:solidFill>
+              </a:rPr>
+              <a:t> HEATING_RATE</a:t>
+            </a:r>
+          </a:p>
+          <a:p>
+            <a:pPr marL="0" indent="0">
+              <a:buNone/>
+            </a:pPr>
+            <a:r>
+              <a:rPr lang="en-US" sz="1400" dirty="0">
+                <a:solidFill>
+                  <a:srgbClr val="C00000"/>
+                </a:solidFill>
+              </a:rPr>
+              <a:t>                        heating rate in K/s</a:t>
+            </a:r>
+          </a:p>
+          <a:p>
+            <a:pPr marL="0" indent="0">
+              <a:buNone/>
+            </a:pPr>
+            <a:r>
+              <a:rPr lang="en-US" sz="1400" dirty="0">
+                <a:solidFill>
+                  <a:srgbClr val="C00000"/>
+                </a:solidFill>
+              </a:rPr>
+              <a:t>  -s STOP_TIME, --</a:t>
+            </a:r>
+            <a:r>
+              <a:rPr lang="en-US" sz="1400" dirty="0" err="1">
+                <a:solidFill>
+                  <a:srgbClr val="C00000"/>
+                </a:solidFill>
+              </a:rPr>
+              <a:t>stop_time</a:t>
+            </a:r>
+            <a:r>
+              <a:rPr lang="en-US" sz="1400" dirty="0">
+                <a:solidFill>
+                  <a:srgbClr val="C00000"/>
+                </a:solidFill>
+              </a:rPr>
+              <a:t> STOP_TIME</a:t>
+            </a:r>
+          </a:p>
+          <a:p>
+            <a:pPr marL="0" indent="0">
+              <a:buNone/>
+            </a:pPr>
+            <a:r>
+              <a:rPr lang="en-US" sz="1400" dirty="0">
+                <a:solidFill>
+                  <a:srgbClr val="C00000"/>
+                </a:solidFill>
+              </a:rPr>
+              <a:t>                        stop time in seconds</a:t>
+            </a:r>
+          </a:p>
+          <a:p>
+            <a:pPr marL="0" indent="0">
+              <a:buNone/>
+            </a:pPr>
+            <a:endParaRPr lang="en-US" altLang="x-none" sz="1400" dirty="0">
+              <a:ea typeface="ＭＳ Ｐゴシック" charset="-128"/>
+            </a:endParaRPr>
+          </a:p>
+        </p:txBody>
+      </p:sp>
+      <p:sp>
+        <p:nvSpPr>
+          <p:cNvPr id="40963" name="Footer Placeholder 3"/>
+          <p:cNvSpPr>
+            <a:spLocks noGrp="1"/>
+          </p:cNvSpPr>
+          <p:nvPr>
+            <p:ph type="ftr" sz="quarter" idx="10"/>
+          </p:nvPr>
+        </p:nvSpPr>
+        <p:spPr bwMode="auto">
+          <a:noFill/>
+          <a:extLst>
+            <a:ext uri="{909E8E84-426E-40DD-AFC4-6F175D3DCCD1}">
+              <a14:hiddenFill xmlns:a14="http://schemas.microsoft.com/office/drawing/2010/main">
+                <a:solidFill>
+                  <a:srgbClr val="FFFFFF"/>
+                </a:solidFill>
+              </a14:hiddenFill>
+            </a:ext>
+            <a:ext uri="{91240B29-F687-4F45-9708-019B960494DF}">
+              <a14:hiddenLine xmlns:a14="http://schemas.microsoft.com/office/drawing/2010/main" w="9525">
+                <a:solidFill>
+                  <a:srgbClr val="000000"/>
+                </a:solidFill>
+                <a:miter lim="800000"/>
+                <a:headEnd/>
+                <a:tailEnd/>
+              </a14:hiddenLine>
+            </a:ext>
+          </a:extLst>
+        </p:spPr>
+        <p:txBody>
+          <a:bodyPr/>
+          <a:lstStyle>
+            <a:lvl1pPr>
+              <a:defRPr>
+                <a:solidFill>
+                  <a:schemeClr val="tx1"/>
+                </a:solidFill>
+                <a:latin typeface="Arial" charset="0"/>
+                <a:ea typeface="ＭＳ Ｐゴシック" charset="-128"/>
+              </a:defRPr>
+            </a:lvl1pPr>
+            <a:lvl2pPr marL="742950" indent="-285750">
+              <a:defRPr>
+                <a:solidFill>
+                  <a:schemeClr val="tx1"/>
+                </a:solidFill>
+                <a:latin typeface="Arial" charset="0"/>
+                <a:ea typeface="ＭＳ Ｐゴシック" charset="-128"/>
+              </a:defRPr>
+            </a:lvl2pPr>
+            <a:lvl3pPr marL="1143000" indent="-228600">
+              <a:defRPr>
+                <a:solidFill>
+                  <a:schemeClr val="tx1"/>
+                </a:solidFill>
+                <a:latin typeface="Arial" charset="0"/>
+                <a:ea typeface="ＭＳ Ｐゴシック" charset="-128"/>
+              </a:defRPr>
+            </a:lvl3pPr>
+            <a:lvl4pPr marL="1600200" indent="-228600">
+              <a:defRPr>
+                <a:solidFill>
+                  <a:schemeClr val="tx1"/>
+                </a:solidFill>
+                <a:latin typeface="Arial" charset="0"/>
+                <a:ea typeface="ＭＳ Ｐゴシック" charset="-128"/>
+              </a:defRPr>
+            </a:lvl4pPr>
+            <a:lvl5pPr marL="2057400" indent="-228600">
+              <a:defRPr>
+                <a:solidFill>
+                  <a:schemeClr val="tx1"/>
+                </a:solidFill>
+                <a:latin typeface="Arial" charset="0"/>
+                <a:ea typeface="ＭＳ Ｐゴシック" charset="-128"/>
+              </a:defRPr>
+            </a:lvl5pPr>
+            <a:lvl6pPr marL="2514600" indent="-228600" defTabSz="457200" eaLnBrk="0" fontAlgn="base" hangingPunct="0">
+              <a:spcBef>
+                <a:spcPct val="0"/>
+              </a:spcBef>
+              <a:spcAft>
+                <a:spcPct val="0"/>
+              </a:spcAft>
+              <a:defRPr>
+                <a:solidFill>
+                  <a:schemeClr val="tx1"/>
+                </a:solidFill>
+                <a:latin typeface="Arial" charset="0"/>
+                <a:ea typeface="ＭＳ Ｐゴシック" charset="-128"/>
+              </a:defRPr>
+            </a:lvl6pPr>
+            <a:lvl7pPr marL="2971800" indent="-228600" defTabSz="457200" eaLnBrk="0" fontAlgn="base" hangingPunct="0">
+              <a:spcBef>
+                <a:spcPct val="0"/>
+              </a:spcBef>
+              <a:spcAft>
+                <a:spcPct val="0"/>
+              </a:spcAft>
+              <a:defRPr>
+                <a:solidFill>
+                  <a:schemeClr val="tx1"/>
+                </a:solidFill>
+                <a:latin typeface="Arial" charset="0"/>
+                <a:ea typeface="ＭＳ Ｐゴシック" charset="-128"/>
+              </a:defRPr>
+            </a:lvl7pPr>
+            <a:lvl8pPr marL="3429000" indent="-228600" defTabSz="457200" eaLnBrk="0" fontAlgn="base" hangingPunct="0">
+              <a:spcBef>
+                <a:spcPct val="0"/>
+              </a:spcBef>
+              <a:spcAft>
+                <a:spcPct val="0"/>
+              </a:spcAft>
+              <a:defRPr>
+                <a:solidFill>
+                  <a:schemeClr val="tx1"/>
+                </a:solidFill>
+                <a:latin typeface="Arial" charset="0"/>
+                <a:ea typeface="ＭＳ Ｐゴシック" charset="-128"/>
+              </a:defRPr>
+            </a:lvl8pPr>
+            <a:lvl9pPr marL="3886200" indent="-228600" defTabSz="457200" eaLnBrk="0" fontAlgn="base" hangingPunct="0">
+              <a:spcBef>
+                <a:spcPct val="0"/>
+              </a:spcBef>
+              <a:spcAft>
+                <a:spcPct val="0"/>
+              </a:spcAft>
+              <a:defRPr>
+                <a:solidFill>
+                  <a:schemeClr val="tx1"/>
+                </a:solidFill>
+                <a:latin typeface="Arial" charset="0"/>
+                <a:ea typeface="ＭＳ Ｐゴシック" charset="-128"/>
+              </a:defRPr>
+            </a:lvl9pPr>
+          </a:lstStyle>
+          <a:p>
+            <a:r>
+              <a:rPr lang="en-US" altLang="x-none" dirty="0" smtClean="0">
+                <a:solidFill>
+                  <a:srgbClr val="898989"/>
+                </a:solidFill>
+                <a:latin typeface="Calibri" charset="0"/>
+              </a:rPr>
+              <a:t>Beck, </a:t>
+            </a:r>
+            <a:r>
+              <a:rPr lang="en-US" altLang="x-none" dirty="0" err="1" smtClean="0">
+                <a:solidFill>
+                  <a:srgbClr val="898989"/>
+                </a:solidFill>
+                <a:latin typeface="Calibri" charset="0"/>
+              </a:rPr>
+              <a:t>Hellerstein</a:t>
+            </a:r>
+            <a:r>
+              <a:rPr lang="en-US" altLang="x-none" dirty="0" smtClean="0">
+                <a:solidFill>
+                  <a:srgbClr val="898989"/>
+                </a:solidFill>
+                <a:latin typeface="Calibri" charset="0"/>
+              </a:rPr>
+              <a:t> &amp; </a:t>
+            </a:r>
+            <a:r>
+              <a:rPr lang="en-US" altLang="x-none" dirty="0" err="1" smtClean="0">
+                <a:solidFill>
+                  <a:srgbClr val="898989"/>
+                </a:solidFill>
+                <a:latin typeface="Calibri" charset="0"/>
+              </a:rPr>
+              <a:t>VanderPlas</a:t>
+            </a:r>
+            <a:r>
+              <a:rPr lang="en-US" altLang="x-none" dirty="0" smtClean="0">
+                <a:solidFill>
+                  <a:srgbClr val="898989"/>
+                </a:solidFill>
+                <a:latin typeface="Calibri" charset="0"/>
+              </a:rPr>
+              <a:t>, 2018</a:t>
+            </a:r>
+            <a:endParaRPr lang="en-US" altLang="x-none" dirty="0">
+              <a:solidFill>
+                <a:srgbClr val="898989"/>
+              </a:solidFill>
+              <a:latin typeface="Calibri" charset="0"/>
+            </a:endParaRPr>
+          </a:p>
+        </p:txBody>
+      </p:sp>
+    </p:spTree>
+    <p:extLst>
+      <p:ext uri="{BB962C8B-B14F-4D97-AF65-F5344CB8AC3E}">
+        <p14:creationId xmlns:p14="http://schemas.microsoft.com/office/powerpoint/2010/main" val="55535477"/>
+      </p:ext>
+    </p:extLst>
+  </p:cSld>
+  <p:clrMapOvr>
+    <a:masterClrMapping/>
+  </p:clrMapOvr>
+  <p:timing>
+    <p:tnLst>
+      <p:par>
+        <p:cTn id="1" dur="indefinite" restart="never" nodeType="tmRoot"/>
+      </p:par>
+    </p:tnLst>
+  </p:timing>
+</p:sld>
+</file>
+
+<file path=ppt/slides/slide18.xml><?xml version="1.0" encoding="utf-8"?>
+<p:sld xmlns:a="http://schemas.openxmlformats.org/drawingml/2006/main" xmlns:r="http://schemas.openxmlformats.org/officeDocument/2006/relationships" xmlns:p="http://schemas.openxmlformats.org/presentationml/2006/main">
+  <p:cSld>
+    <p:spTree>
+      <p:nvGrpSpPr>
+        <p:cNvPr id="1" name=""/>
+        <p:cNvGrpSpPr/>
+        <p:nvPr/>
+      </p:nvGrpSpPr>
+      <p:grpSpPr>
+        <a:xfrm>
+          <a:off x="0" y="0"/>
+          <a:ext cx="0" cy="0"/>
+          <a:chOff x="0" y="0"/>
+          <a:chExt cx="0" cy="0"/>
+        </a:xfrm>
+      </p:grpSpPr>
+      <p:sp>
+        <p:nvSpPr>
+          <p:cNvPr id="40961" name="Title 1"/>
+          <p:cNvSpPr>
+            <a:spLocks noGrp="1"/>
+          </p:cNvSpPr>
+          <p:nvPr>
+            <p:ph type="title"/>
+          </p:nvPr>
+        </p:nvSpPr>
+        <p:spPr bwMode="auto">
+          <a:xfrm>
+            <a:off x="304800" y="381000"/>
+            <a:ext cx="8382000" cy="838200"/>
+          </a:xfrm>
+          <a:noFill/>
+          <a:extLst>
+            <a:ext uri="{909E8E84-426E-40DD-AFC4-6F175D3DCCD1}">
+              <a14:hiddenFill xmlns:a14="http://schemas.microsoft.com/office/drawing/2010/main">
+                <a:solidFill>
+                  <a:srgbClr val="FFFFFF"/>
+                </a:solidFill>
+              </a14:hiddenFill>
+            </a:ext>
+            <a:ext uri="{91240B29-F687-4F45-9708-019B960494DF}">
+              <a14:hiddenLine xmlns:a14="http://schemas.microsoft.com/office/drawing/2010/main" w="9525">
+                <a:solidFill>
+                  <a:srgbClr val="000000"/>
+                </a:solidFill>
+                <a:miter lim="800000"/>
+                <a:headEnd/>
+                <a:tailEnd/>
+              </a14:hiddenLine>
+            </a:ext>
+          </a:extLst>
+        </p:spPr>
+        <p:txBody>
+          <a:bodyPr vert="horz" wrap="square" lIns="91440" tIns="45720" rIns="91440" bIns="45720" numCol="1" anchor="t" anchorCtr="0" compatLnSpc="1">
+            <a:prstTxWarp prst="textNoShape">
+              <a:avLst/>
+            </a:prstTxWarp>
+          </a:bodyPr>
+          <a:lstStyle/>
+          <a:p>
+            <a:r>
+              <a:rPr lang="en-US" altLang="x-none" dirty="0">
+                <a:ea typeface="ＭＳ Ｐゴシック" charset="-128"/>
+              </a:rPr>
+              <a:t>Example of A Technology Review</a:t>
+            </a:r>
+            <a:br>
+              <a:rPr lang="en-US" altLang="x-none" dirty="0">
+                <a:ea typeface="ＭＳ Ｐゴシック" charset="-128"/>
+              </a:rPr>
+            </a:br>
+            <a:r>
+              <a:rPr lang="en-US" altLang="x-none" i="1" dirty="0" smtClean="0">
+                <a:ea typeface="ＭＳ Ｐゴシック" charset="-128"/>
+              </a:rPr>
+              <a:t>Command line argument parsing</a:t>
+            </a:r>
+            <a:endParaRPr lang="en-US" altLang="x-none" i="1" dirty="0">
+              <a:ea typeface="ＭＳ Ｐゴシック" charset="-128"/>
+            </a:endParaRPr>
+          </a:p>
+        </p:txBody>
+      </p:sp>
+      <p:sp>
+        <p:nvSpPr>
+          <p:cNvPr id="40962" name="Content Placeholder 2"/>
+          <p:cNvSpPr>
+            <a:spLocks noGrp="1"/>
+          </p:cNvSpPr>
+          <p:nvPr>
+            <p:ph idx="1"/>
+          </p:nvPr>
+        </p:nvSpPr>
+        <p:spPr bwMode="auto">
+          <a:xfrm>
+            <a:off x="457200" y="1600200"/>
+            <a:ext cx="8229600" cy="4572000"/>
+          </a:xfrm>
+          <a:noFill/>
+          <a:extLst>
+            <a:ext uri="{909E8E84-426E-40DD-AFC4-6F175D3DCCD1}">
+              <a14:hiddenFill xmlns:a14="http://schemas.microsoft.com/office/drawing/2010/main">
+                <a:solidFill>
+                  <a:srgbClr val="FFFFFF"/>
+                </a:solidFill>
+              </a14:hiddenFill>
+            </a:ext>
+            <a:ext uri="{91240B29-F687-4F45-9708-019B960494DF}">
+              <a14:hiddenLine xmlns:a14="http://schemas.microsoft.com/office/drawing/2010/main" w="9525">
+                <a:solidFill>
+                  <a:srgbClr val="000000"/>
+                </a:solidFill>
+                <a:miter lim="800000"/>
+                <a:headEnd/>
+                <a:tailEnd/>
+              </a14:hiddenLine>
+            </a:ext>
+          </a:extLst>
+        </p:spPr>
+        <p:txBody>
+          <a:bodyPr vert="horz" wrap="square" lIns="91440" tIns="45720" rIns="91440" bIns="45720" numCol="1" anchor="t" anchorCtr="0" compatLnSpc="1">
+            <a:prstTxWarp prst="textNoShape">
+              <a:avLst/>
+            </a:prstTxWarp>
+          </a:bodyPr>
+          <a:lstStyle/>
+          <a:p>
+            <a:pPr marL="0" indent="0">
+              <a:buNone/>
+            </a:pPr>
+            <a:r>
+              <a:rPr lang="en-US" sz="1400" dirty="0">
+                <a:solidFill>
+                  <a:schemeClr val="bg1">
+                    <a:lumMod val="75000"/>
+                  </a:schemeClr>
+                </a:solidFill>
+              </a:rPr>
+              <a:t>[dacb@D-108-179-129-50 ~/</a:t>
+            </a:r>
+            <a:r>
+              <a:rPr lang="en-US" sz="1400" dirty="0" err="1">
+                <a:solidFill>
+                  <a:schemeClr val="bg1">
+                    <a:lumMod val="75000"/>
+                  </a:schemeClr>
+                </a:solidFill>
+              </a:rPr>
+              <a:t>tmp</a:t>
+            </a:r>
+            <a:r>
+              <a:rPr lang="en-US" sz="1400" dirty="0" smtClean="0">
+                <a:solidFill>
+                  <a:schemeClr val="bg1">
+                    <a:lumMod val="75000"/>
+                  </a:schemeClr>
+                </a:solidFill>
+              </a:rPr>
+              <a:t>]$ </a:t>
+            </a:r>
+            <a:r>
+              <a:rPr lang="en-US" sz="1400" dirty="0" smtClean="0"/>
+              <a:t>./</a:t>
+            </a:r>
+            <a:r>
+              <a:rPr lang="en-US" sz="1400" dirty="0" err="1"/>
+              <a:t>solver.py</a:t>
+            </a:r>
+            <a:r>
+              <a:rPr lang="en-US" sz="1400" dirty="0"/>
+              <a:t> --PLIGC 1.444234 --PLIGH 0.442 --PLIGO 0.320500 --temperature 325.0</a:t>
+            </a:r>
+          </a:p>
+          <a:p>
+            <a:pPr marL="0" indent="0">
+              <a:buNone/>
+            </a:pPr>
+            <a:r>
+              <a:rPr lang="en-US" sz="1400" dirty="0">
+                <a:solidFill>
+                  <a:srgbClr val="C00000"/>
+                </a:solidFill>
+              </a:rPr>
+              <a:t>Solver arguments are:</a:t>
+            </a:r>
+          </a:p>
+          <a:p>
+            <a:pPr marL="0" indent="0">
+              <a:buNone/>
+            </a:pPr>
+            <a:r>
+              <a:rPr lang="en-US" sz="1400" dirty="0" smtClean="0">
+                <a:solidFill>
+                  <a:srgbClr val="C00000"/>
+                </a:solidFill>
+              </a:rPr>
+              <a:t>	PLIGC	= 1.444234</a:t>
             </a:r>
             <a:endParaRPr lang="en-US" sz="1400" dirty="0">
               <a:solidFill>
@@ -11292,7 +11773,7 @@
 </p:sld>
 </file>
 
-<file path=ppt/slides/slide18.xml><?xml version="1.0" encoding="utf-8"?>
+<file path=ppt/slides/slide19.xml><?xml version="1.0" encoding="utf-8"?>
 <p:sld xmlns:a="http://schemas.openxmlformats.org/drawingml/2006/main" xmlns:r="http://schemas.openxmlformats.org/officeDocument/2006/relationships" xmlns:p="http://schemas.openxmlformats.org/presentationml/2006/main">
   <p:cSld>
     <p:spTree>
@@ -11732,7 +12213,408 @@
 </p:sld>
 </file>
 
-<file path=ppt/slides/slide19.xml><?xml version="1.0" encoding="utf-8"?>
+<file path=ppt/slides/slide2.xml><?xml version="1.0" encoding="utf-8"?>
+<p:sld xmlns:a="http://schemas.openxmlformats.org/drawingml/2006/main" xmlns:r="http://schemas.openxmlformats.org/officeDocument/2006/relationships" xmlns:p="http://schemas.openxmlformats.org/presentationml/2006/main">
+  <p:cSld>
+    <p:spTree>
+      <p:nvGrpSpPr>
+        <p:cNvPr id="1" name=""/>
+        <p:cNvGrpSpPr/>
+        <p:nvPr/>
+      </p:nvGrpSpPr>
+      <p:grpSpPr>
+        <a:xfrm>
+          <a:off x="0" y="0"/>
+          <a:ext cx="0" cy="0"/>
+          <a:chOff x="0" y="0"/>
+          <a:chExt cx="0" cy="0"/>
+        </a:xfrm>
+      </p:grpSpPr>
+      <p:sp>
+        <p:nvSpPr>
+          <p:cNvPr id="17409" name="Title 1"/>
+          <p:cNvSpPr>
+            <a:spLocks noGrp="1"/>
+          </p:cNvSpPr>
+          <p:nvPr>
+            <p:ph type="title"/>
+          </p:nvPr>
+        </p:nvSpPr>
+        <p:spPr bwMode="auto">
+          <a:noFill/>
+          <a:extLst>
+            <a:ext uri="{909E8E84-426E-40DD-AFC4-6F175D3DCCD1}">
+              <a14:hiddenFill xmlns:a14="http://schemas.microsoft.com/office/drawing/2010/main">
+                <a:solidFill>
+                  <a:srgbClr val="FFFFFF"/>
+                </a:solidFill>
+              </a14:hiddenFill>
+            </a:ext>
+            <a:ext uri="{91240B29-F687-4F45-9708-019B960494DF}">
+              <a14:hiddenLine xmlns:a14="http://schemas.microsoft.com/office/drawing/2010/main" w="9525">
+                <a:solidFill>
+                  <a:srgbClr val="000000"/>
+                </a:solidFill>
+                <a:miter lim="800000"/>
+                <a:headEnd/>
+                <a:tailEnd/>
+              </a14:hiddenLine>
+            </a:ext>
+          </a:extLst>
+        </p:spPr>
+        <p:txBody>
+          <a:bodyPr vert="horz" wrap="square" lIns="91440" tIns="45720" rIns="91440" bIns="45720" numCol="1" anchor="t" anchorCtr="0" compatLnSpc="1">
+            <a:prstTxWarp prst="textNoShape">
+              <a:avLst/>
+            </a:prstTxWarp>
+          </a:bodyPr>
+          <a:lstStyle/>
+          <a:p>
+            <a:r>
+              <a:rPr lang="en-US" altLang="x-none">
+                <a:ea typeface="ＭＳ Ｐゴシック" charset="-128"/>
+              </a:rPr>
+              <a:t>Agenda</a:t>
+            </a:r>
+          </a:p>
+        </p:txBody>
+      </p:sp>
+      <p:sp>
+        <p:nvSpPr>
+          <p:cNvPr id="17410" name="Content Placeholder 2"/>
+          <p:cNvSpPr>
+            <a:spLocks noGrp="1"/>
+          </p:cNvSpPr>
+          <p:nvPr>
+            <p:ph idx="1"/>
+          </p:nvPr>
+        </p:nvSpPr>
+        <p:spPr bwMode="auto">
+          <a:xfrm>
+            <a:off x="457200" y="1371600"/>
+            <a:ext cx="8229600" cy="4572000"/>
+          </a:xfrm>
+          <a:noFill/>
+          <a:extLst>
+            <a:ext uri="{909E8E84-426E-40DD-AFC4-6F175D3DCCD1}">
+              <a14:hiddenFill xmlns:a14="http://schemas.microsoft.com/office/drawing/2010/main">
+                <a:solidFill>
+                  <a:srgbClr val="FFFFFF"/>
+                </a:solidFill>
+              </a14:hiddenFill>
+            </a:ext>
+            <a:ext uri="{91240B29-F687-4F45-9708-019B960494DF}">
+              <a14:hiddenLine xmlns:a14="http://schemas.microsoft.com/office/drawing/2010/main" w="9525">
+                <a:solidFill>
+                  <a:srgbClr val="000000"/>
+                </a:solidFill>
+                <a:miter lim="800000"/>
+                <a:headEnd/>
+                <a:tailEnd/>
+              </a14:hiddenLine>
+            </a:ext>
+          </a:extLst>
+        </p:spPr>
+        <p:txBody>
+          <a:bodyPr vert="horz" wrap="square" lIns="91440" tIns="45720" rIns="91440" bIns="45720" numCol="1" anchor="t" anchorCtr="0" compatLnSpc="1">
+            <a:prstTxWarp prst="textNoShape">
+              <a:avLst/>
+            </a:prstTxWarp>
+          </a:bodyPr>
+          <a:lstStyle/>
+          <a:p>
+            <a:r>
+              <a:rPr lang="en-US" altLang="x-none" dirty="0">
+                <a:ea typeface="ＭＳ Ｐゴシック" charset="-128"/>
+              </a:rPr>
+              <a:t>Software </a:t>
+            </a:r>
+            <a:r>
+              <a:rPr lang="en-US" altLang="x-none" dirty="0" smtClean="0">
+                <a:ea typeface="ＭＳ Ｐゴシック" charset="-128"/>
+              </a:rPr>
+              <a:t>licenses</a:t>
+            </a:r>
+            <a:endParaRPr lang="en-US" altLang="x-none" dirty="0">
+              <a:ea typeface="ＭＳ Ｐゴシック" charset="-128"/>
+            </a:endParaRPr>
+          </a:p>
+          <a:p>
+            <a:r>
+              <a:rPr lang="en-US" altLang="x-none" dirty="0" smtClean="0">
+                <a:ea typeface="ＭＳ Ｐゴシック" charset="-128"/>
+              </a:rPr>
+              <a:t>Team </a:t>
+            </a:r>
+            <a:r>
+              <a:rPr lang="en-US" altLang="x-none" dirty="0">
+                <a:ea typeface="ＭＳ Ｐゴシック" charset="-128"/>
+              </a:rPr>
+              <a:t>process with in-class exercises:</a:t>
+            </a:r>
+          </a:p>
+          <a:p>
+            <a:pPr lvl="1"/>
+            <a:r>
+              <a:rPr lang="en-US" altLang="x-none" dirty="0">
+                <a:ea typeface="ＭＳ Ｐゴシック" charset="-128"/>
+              </a:rPr>
+              <a:t>Code reviews (</a:t>
+            </a:r>
+            <a:r>
+              <a:rPr lang="en-US" altLang="x-none" dirty="0" smtClean="0">
+                <a:ea typeface="ＭＳ Ｐゴシック" charset="-128"/>
+              </a:rPr>
+              <a:t>10 </a:t>
+            </a:r>
+            <a:r>
+              <a:rPr lang="en-US" altLang="x-none" dirty="0">
+                <a:ea typeface="ＭＳ Ｐゴシック" charset="-128"/>
+              </a:rPr>
+              <a:t>min)</a:t>
+            </a:r>
+          </a:p>
+          <a:p>
+            <a:pPr lvl="1"/>
+            <a:r>
+              <a:rPr lang="en-US" altLang="x-none" dirty="0">
+                <a:ea typeface="ＭＳ Ｐゴシック" charset="-128"/>
+              </a:rPr>
+              <a:t>Technology </a:t>
+            </a:r>
+            <a:r>
+              <a:rPr lang="en-US" altLang="x-none" dirty="0" smtClean="0">
+                <a:ea typeface="ＭＳ Ｐゴシック" charset="-128"/>
+              </a:rPr>
+              <a:t>review (30 min)</a:t>
+            </a:r>
+          </a:p>
+          <a:p>
+            <a:pPr lvl="1"/>
+            <a:r>
+              <a:rPr lang="en-US" altLang="x-none" dirty="0" smtClean="0">
+                <a:ea typeface="ＭＳ Ｐゴシック" charset="-128"/>
+              </a:rPr>
+              <a:t>Status standup</a:t>
+            </a:r>
+            <a:endParaRPr lang="en-US" altLang="x-none" dirty="0">
+              <a:ea typeface="ＭＳ Ｐゴシック" charset="-128"/>
+            </a:endParaRPr>
+          </a:p>
+        </p:txBody>
+      </p:sp>
+      <p:sp>
+        <p:nvSpPr>
+          <p:cNvPr id="17411" name="Footer Placeholder 3"/>
+          <p:cNvSpPr>
+            <a:spLocks noGrp="1"/>
+          </p:cNvSpPr>
+          <p:nvPr>
+            <p:ph type="ftr" sz="quarter" idx="10"/>
+          </p:nvPr>
+        </p:nvSpPr>
+        <p:spPr bwMode="auto">
+          <a:noFill/>
+          <a:extLst>
+            <a:ext uri="{909E8E84-426E-40DD-AFC4-6F175D3DCCD1}">
+              <a14:hiddenFill xmlns:a14="http://schemas.microsoft.com/office/drawing/2010/main">
+                <a:solidFill>
+                  <a:srgbClr val="FFFFFF"/>
+                </a:solidFill>
+              </a14:hiddenFill>
+            </a:ext>
+            <a:ext uri="{91240B29-F687-4F45-9708-019B960494DF}">
+              <a14:hiddenLine xmlns:a14="http://schemas.microsoft.com/office/drawing/2010/main" w="9525">
+                <a:solidFill>
+                  <a:srgbClr val="000000"/>
+                </a:solidFill>
+                <a:miter lim="800000"/>
+                <a:headEnd/>
+                <a:tailEnd/>
+              </a14:hiddenLine>
+            </a:ext>
+          </a:extLst>
+        </p:spPr>
+        <p:txBody>
+          <a:bodyPr/>
+          <a:lstStyle>
+            <a:lvl1pPr>
+              <a:defRPr>
+                <a:solidFill>
+                  <a:schemeClr val="tx1"/>
+                </a:solidFill>
+                <a:latin typeface="Arial" charset="0"/>
+                <a:ea typeface="ＭＳ Ｐゴシック" charset="-128"/>
+              </a:defRPr>
+            </a:lvl1pPr>
+            <a:lvl2pPr marL="742950" indent="-285750">
+              <a:defRPr>
+                <a:solidFill>
+                  <a:schemeClr val="tx1"/>
+                </a:solidFill>
+                <a:latin typeface="Arial" charset="0"/>
+                <a:ea typeface="ＭＳ Ｐゴシック" charset="-128"/>
+              </a:defRPr>
+            </a:lvl2pPr>
+            <a:lvl3pPr marL="1143000" indent="-228600">
+              <a:defRPr>
+                <a:solidFill>
+                  <a:schemeClr val="tx1"/>
+                </a:solidFill>
+                <a:latin typeface="Arial" charset="0"/>
+                <a:ea typeface="ＭＳ Ｐゴシック" charset="-128"/>
+              </a:defRPr>
+            </a:lvl3pPr>
+            <a:lvl4pPr marL="1600200" indent="-228600">
+              <a:defRPr>
+                <a:solidFill>
+                  <a:schemeClr val="tx1"/>
+                </a:solidFill>
+                <a:latin typeface="Arial" charset="0"/>
+                <a:ea typeface="ＭＳ Ｐゴシック" charset="-128"/>
+              </a:defRPr>
+            </a:lvl4pPr>
+            <a:lvl5pPr marL="2057400" indent="-228600">
+              <a:defRPr>
+                <a:solidFill>
+                  <a:schemeClr val="tx1"/>
+                </a:solidFill>
+                <a:latin typeface="Arial" charset="0"/>
+                <a:ea typeface="ＭＳ Ｐゴシック" charset="-128"/>
+              </a:defRPr>
+            </a:lvl5pPr>
+            <a:lvl6pPr marL="2514600" indent="-228600" defTabSz="457200" eaLnBrk="0" fontAlgn="base" hangingPunct="0">
+              <a:spcBef>
+                <a:spcPct val="0"/>
+              </a:spcBef>
+              <a:spcAft>
+                <a:spcPct val="0"/>
+              </a:spcAft>
+              <a:defRPr>
+                <a:solidFill>
+                  <a:schemeClr val="tx1"/>
+                </a:solidFill>
+                <a:latin typeface="Arial" charset="0"/>
+                <a:ea typeface="ＭＳ Ｐゴシック" charset="-128"/>
+              </a:defRPr>
+            </a:lvl6pPr>
+            <a:lvl7pPr marL="2971800" indent="-228600" defTabSz="457200" eaLnBrk="0" fontAlgn="base" hangingPunct="0">
+              <a:spcBef>
+                <a:spcPct val="0"/>
+              </a:spcBef>
+              <a:spcAft>
+                <a:spcPct val="0"/>
+              </a:spcAft>
+              <a:defRPr>
+                <a:solidFill>
+                  <a:schemeClr val="tx1"/>
+                </a:solidFill>
+                <a:latin typeface="Arial" charset="0"/>
+                <a:ea typeface="ＭＳ Ｐゴシック" charset="-128"/>
+              </a:defRPr>
+            </a:lvl7pPr>
+            <a:lvl8pPr marL="3429000" indent="-228600" defTabSz="457200" eaLnBrk="0" fontAlgn="base" hangingPunct="0">
+              <a:spcBef>
+                <a:spcPct val="0"/>
+              </a:spcBef>
+              <a:spcAft>
+                <a:spcPct val="0"/>
+              </a:spcAft>
+              <a:defRPr>
+                <a:solidFill>
+                  <a:schemeClr val="tx1"/>
+                </a:solidFill>
+                <a:latin typeface="Arial" charset="0"/>
+                <a:ea typeface="ＭＳ Ｐゴシック" charset="-128"/>
+              </a:defRPr>
+            </a:lvl8pPr>
+            <a:lvl9pPr marL="3886200" indent="-228600" defTabSz="457200" eaLnBrk="0" fontAlgn="base" hangingPunct="0">
+              <a:spcBef>
+                <a:spcPct val="0"/>
+              </a:spcBef>
+              <a:spcAft>
+                <a:spcPct val="0"/>
+              </a:spcAft>
+              <a:defRPr>
+                <a:solidFill>
+                  <a:schemeClr val="tx1"/>
+                </a:solidFill>
+                <a:latin typeface="Arial" charset="0"/>
+                <a:ea typeface="ＭＳ Ｐゴシック" charset="-128"/>
+              </a:defRPr>
+            </a:lvl9pPr>
+          </a:lstStyle>
+          <a:p>
+            <a:r>
+              <a:rPr lang="en-US" altLang="x-none" dirty="0" smtClean="0">
+                <a:solidFill>
+                  <a:srgbClr val="898989"/>
+                </a:solidFill>
+                <a:latin typeface="Calibri" charset="0"/>
+              </a:rPr>
+              <a:t>Beck, </a:t>
+            </a:r>
+            <a:r>
+              <a:rPr lang="en-US" altLang="x-none" dirty="0" err="1" smtClean="0">
+                <a:solidFill>
+                  <a:srgbClr val="898989"/>
+                </a:solidFill>
+                <a:latin typeface="Calibri" charset="0"/>
+              </a:rPr>
+              <a:t>Hellerstein</a:t>
+            </a:r>
+            <a:r>
+              <a:rPr lang="en-US" altLang="x-none" dirty="0" smtClean="0">
+                <a:solidFill>
+                  <a:srgbClr val="898989"/>
+                </a:solidFill>
+                <a:latin typeface="Calibri" charset="0"/>
+              </a:rPr>
+              <a:t> &amp; </a:t>
+            </a:r>
+            <a:r>
+              <a:rPr lang="en-US" altLang="x-none" dirty="0" err="1" smtClean="0">
+                <a:solidFill>
+                  <a:srgbClr val="898989"/>
+                </a:solidFill>
+                <a:latin typeface="Calibri" charset="0"/>
+              </a:rPr>
+              <a:t>VanderPlas</a:t>
+            </a:r>
+            <a:r>
+              <a:rPr lang="en-US" altLang="x-none" dirty="0" smtClean="0">
+                <a:solidFill>
+                  <a:srgbClr val="898989"/>
+                </a:solidFill>
+                <a:latin typeface="Calibri" charset="0"/>
+              </a:rPr>
+              <a:t>, 2018</a:t>
+            </a:r>
+            <a:endParaRPr lang="en-US" altLang="x-none" dirty="0">
+              <a:solidFill>
+                <a:srgbClr val="898989"/>
+              </a:solidFill>
+              <a:latin typeface="Calibri" charset="0"/>
+            </a:endParaRPr>
+          </a:p>
+        </p:txBody>
+      </p:sp>
+    </p:spTree>
+  </p:cSld>
+  <p:clrMapOvr>
+    <a:masterClrMapping/>
+  </p:clrMapOvr>
+  <p:timing>
+    <p:tnLst>
+      <p:par>
+        <p:cTn id="1" dur="indefinite" restart="never" nodeType="tmRoot"/>
+      </p:par>
+    </p:tnLst>
+  </p:timing>
+</p:sld>
+</file>
+
+<file path=ppt/slides/slide20.xml><?xml version="1.0" encoding="utf-8"?>
 <p:sld xmlns:a="http://schemas.openxmlformats.org/drawingml/2006/main" xmlns:r="http://schemas.openxmlformats.org/officeDocument/2006/relationships" xmlns:p="http://schemas.openxmlformats.org/presentationml/2006/main">
   <p:cSld>
     <p:spTree>
@@ -12134,408 +13016,7 @@
 </p:sld>
 </file>
 
-<file path=ppt/slides/slide2.xml><?xml version="1.0" encoding="utf-8"?>
-<p:sld xmlns:a="http://schemas.openxmlformats.org/drawingml/2006/main" xmlns:r="http://schemas.openxmlformats.org/officeDocument/2006/relationships" xmlns:p="http://schemas.openxmlformats.org/presentationml/2006/main">
-  <p:cSld>
-    <p:spTree>
-      <p:nvGrpSpPr>
-        <p:cNvPr id="1" name=""/>
-        <p:cNvGrpSpPr/>
-        <p:nvPr/>
-      </p:nvGrpSpPr>
-      <p:grpSpPr>
-        <a:xfrm>
-          <a:off x="0" y="0"/>
-          <a:ext cx="0" cy="0"/>
-          <a:chOff x="0" y="0"/>
-          <a:chExt cx="0" cy="0"/>
-        </a:xfrm>
-      </p:grpSpPr>
-      <p:sp>
-        <p:nvSpPr>
-          <p:cNvPr id="17409" name="Title 1"/>
-          <p:cNvSpPr>
-            <a:spLocks noGrp="1"/>
-          </p:cNvSpPr>
-          <p:nvPr>
-            <p:ph type="title"/>
-          </p:nvPr>
-        </p:nvSpPr>
-        <p:spPr bwMode="auto">
-          <a:noFill/>
-          <a:extLst>
-            <a:ext uri="{909E8E84-426E-40DD-AFC4-6F175D3DCCD1}">
-              <a14:hiddenFill xmlns:a14="http://schemas.microsoft.com/office/drawing/2010/main">
-                <a:solidFill>
-                  <a:srgbClr val="FFFFFF"/>
-                </a:solidFill>
-              </a14:hiddenFill>
-            </a:ext>
-            <a:ext uri="{91240B29-F687-4F45-9708-019B960494DF}">
-              <a14:hiddenLine xmlns:a14="http://schemas.microsoft.com/office/drawing/2010/main" w="9525">
-                <a:solidFill>
-                  <a:srgbClr val="000000"/>
-                </a:solidFill>
-                <a:miter lim="800000"/>
-                <a:headEnd/>
-                <a:tailEnd/>
-              </a14:hiddenLine>
-            </a:ext>
-          </a:extLst>
-        </p:spPr>
-        <p:txBody>
-          <a:bodyPr vert="horz" wrap="square" lIns="91440" tIns="45720" rIns="91440" bIns="45720" numCol="1" anchor="t" anchorCtr="0" compatLnSpc="1">
-            <a:prstTxWarp prst="textNoShape">
-              <a:avLst/>
-            </a:prstTxWarp>
-          </a:bodyPr>
-          <a:lstStyle/>
-          <a:p>
-            <a:r>
-              <a:rPr lang="en-US" altLang="x-none">
-                <a:ea typeface="ＭＳ Ｐゴシック" charset="-128"/>
-              </a:rPr>
-              <a:t>Agenda</a:t>
-            </a:r>
-          </a:p>
-        </p:txBody>
-      </p:sp>
-      <p:sp>
-        <p:nvSpPr>
-          <p:cNvPr id="17410" name="Content Placeholder 2"/>
-          <p:cNvSpPr>
-            <a:spLocks noGrp="1"/>
-          </p:cNvSpPr>
-          <p:nvPr>
-            <p:ph idx="1"/>
-          </p:nvPr>
-        </p:nvSpPr>
-        <p:spPr bwMode="auto">
-          <a:xfrm>
-            <a:off x="457200" y="1371600"/>
-            <a:ext cx="8229600" cy="4572000"/>
-          </a:xfrm>
-          <a:noFill/>
-          <a:extLst>
-            <a:ext uri="{909E8E84-426E-40DD-AFC4-6F175D3DCCD1}">
-              <a14:hiddenFill xmlns:a14="http://schemas.microsoft.com/office/drawing/2010/main">
-                <a:solidFill>
-                  <a:srgbClr val="FFFFFF"/>
-                </a:solidFill>
-              </a14:hiddenFill>
-            </a:ext>
-            <a:ext uri="{91240B29-F687-4F45-9708-019B960494DF}">
-              <a14:hiddenLine xmlns:a14="http://schemas.microsoft.com/office/drawing/2010/main" w="9525">
-                <a:solidFill>
-                  <a:srgbClr val="000000"/>
-                </a:solidFill>
-                <a:miter lim="800000"/>
-                <a:headEnd/>
-                <a:tailEnd/>
-              </a14:hiddenLine>
-            </a:ext>
-          </a:extLst>
-        </p:spPr>
-        <p:txBody>
-          <a:bodyPr vert="horz" wrap="square" lIns="91440" tIns="45720" rIns="91440" bIns="45720" numCol="1" anchor="t" anchorCtr="0" compatLnSpc="1">
-            <a:prstTxWarp prst="textNoShape">
-              <a:avLst/>
-            </a:prstTxWarp>
-          </a:bodyPr>
-          <a:lstStyle/>
-          <a:p>
-            <a:r>
-              <a:rPr lang="en-US" altLang="x-none" dirty="0">
-                <a:ea typeface="ＭＳ Ｐゴシック" charset="-128"/>
-              </a:rPr>
-              <a:t>Software </a:t>
-            </a:r>
-            <a:r>
-              <a:rPr lang="en-US" altLang="x-none" dirty="0" smtClean="0">
-                <a:ea typeface="ＭＳ Ｐゴシック" charset="-128"/>
-              </a:rPr>
-              <a:t>licenses</a:t>
-            </a:r>
-            <a:endParaRPr lang="en-US" altLang="x-none" dirty="0">
-              <a:ea typeface="ＭＳ Ｐゴシック" charset="-128"/>
-            </a:endParaRPr>
-          </a:p>
-          <a:p>
-            <a:r>
-              <a:rPr lang="en-US" altLang="x-none" dirty="0" smtClean="0">
-                <a:ea typeface="ＭＳ Ｐゴシック" charset="-128"/>
-              </a:rPr>
-              <a:t>Team </a:t>
-            </a:r>
-            <a:r>
-              <a:rPr lang="en-US" altLang="x-none" dirty="0">
-                <a:ea typeface="ＭＳ Ｐゴシック" charset="-128"/>
-              </a:rPr>
-              <a:t>process with in-class exercises:</a:t>
-            </a:r>
-          </a:p>
-          <a:p>
-            <a:pPr lvl="1"/>
-            <a:r>
-              <a:rPr lang="en-US" altLang="x-none" dirty="0">
-                <a:ea typeface="ＭＳ Ｐゴシック" charset="-128"/>
-              </a:rPr>
-              <a:t>Code reviews (</a:t>
-            </a:r>
-            <a:r>
-              <a:rPr lang="en-US" altLang="x-none" dirty="0" smtClean="0">
-                <a:ea typeface="ＭＳ Ｐゴシック" charset="-128"/>
-              </a:rPr>
-              <a:t>10 </a:t>
-            </a:r>
-            <a:r>
-              <a:rPr lang="en-US" altLang="x-none" dirty="0">
-                <a:ea typeface="ＭＳ Ｐゴシック" charset="-128"/>
-              </a:rPr>
-              <a:t>min)</a:t>
-            </a:r>
-          </a:p>
-          <a:p>
-            <a:pPr lvl="1"/>
-            <a:r>
-              <a:rPr lang="en-US" altLang="x-none" dirty="0">
-                <a:ea typeface="ＭＳ Ｐゴシック" charset="-128"/>
-              </a:rPr>
-              <a:t>Technology </a:t>
-            </a:r>
-            <a:r>
-              <a:rPr lang="en-US" altLang="x-none" dirty="0" smtClean="0">
-                <a:ea typeface="ＭＳ Ｐゴシック" charset="-128"/>
-              </a:rPr>
-              <a:t>review (30 min)</a:t>
-            </a:r>
-          </a:p>
-          <a:p>
-            <a:pPr lvl="1"/>
-            <a:r>
-              <a:rPr lang="en-US" altLang="x-none" dirty="0" smtClean="0">
-                <a:ea typeface="ＭＳ Ｐゴシック" charset="-128"/>
-              </a:rPr>
-              <a:t>Status standup</a:t>
-            </a:r>
-            <a:endParaRPr lang="en-US" altLang="x-none" dirty="0">
-              <a:ea typeface="ＭＳ Ｐゴシック" charset="-128"/>
-            </a:endParaRPr>
-          </a:p>
-        </p:txBody>
-      </p:sp>
-      <p:sp>
-        <p:nvSpPr>
-          <p:cNvPr id="17411" name="Footer Placeholder 3"/>
-          <p:cNvSpPr>
-            <a:spLocks noGrp="1"/>
-          </p:cNvSpPr>
-          <p:nvPr>
-            <p:ph type="ftr" sz="quarter" idx="10"/>
-          </p:nvPr>
-        </p:nvSpPr>
-        <p:spPr bwMode="auto">
-          <a:noFill/>
-          <a:extLst>
-            <a:ext uri="{909E8E84-426E-40DD-AFC4-6F175D3DCCD1}">
-              <a14:hiddenFill xmlns:a14="http://schemas.microsoft.com/office/drawing/2010/main">
-                <a:solidFill>
-                  <a:srgbClr val="FFFFFF"/>
-                </a:solidFill>
-              </a14:hiddenFill>
-            </a:ext>
-            <a:ext uri="{91240B29-F687-4F45-9708-019B960494DF}">
-              <a14:hiddenLine xmlns:a14="http://schemas.microsoft.com/office/drawing/2010/main" w="9525">
-                <a:solidFill>
-                  <a:srgbClr val="000000"/>
-                </a:solidFill>
-                <a:miter lim="800000"/>
-                <a:headEnd/>
-                <a:tailEnd/>
-              </a14:hiddenLine>
-            </a:ext>
-          </a:extLst>
-        </p:spPr>
-        <p:txBody>
-          <a:bodyPr/>
-          <a:lstStyle>
-            <a:lvl1pPr>
-              <a:defRPr>
-                <a:solidFill>
-                  <a:schemeClr val="tx1"/>
-                </a:solidFill>
-                <a:latin typeface="Arial" charset="0"/>
-                <a:ea typeface="ＭＳ Ｐゴシック" charset="-128"/>
-              </a:defRPr>
-            </a:lvl1pPr>
-            <a:lvl2pPr marL="742950" indent="-285750">
-              <a:defRPr>
-                <a:solidFill>
-                  <a:schemeClr val="tx1"/>
-                </a:solidFill>
-                <a:latin typeface="Arial" charset="0"/>
-                <a:ea typeface="ＭＳ Ｐゴシック" charset="-128"/>
-              </a:defRPr>
-            </a:lvl2pPr>
-            <a:lvl3pPr marL="1143000" indent="-228600">
-              <a:defRPr>
-                <a:solidFill>
-                  <a:schemeClr val="tx1"/>
-                </a:solidFill>
-                <a:latin typeface="Arial" charset="0"/>
-                <a:ea typeface="ＭＳ Ｐゴシック" charset="-128"/>
-              </a:defRPr>
-            </a:lvl3pPr>
-            <a:lvl4pPr marL="1600200" indent="-228600">
-              <a:defRPr>
-                <a:solidFill>
-                  <a:schemeClr val="tx1"/>
-                </a:solidFill>
-                <a:latin typeface="Arial" charset="0"/>
-                <a:ea typeface="ＭＳ Ｐゴシック" charset="-128"/>
-              </a:defRPr>
-            </a:lvl4pPr>
-            <a:lvl5pPr marL="2057400" indent="-228600">
-              <a:defRPr>
-                <a:solidFill>
-                  <a:schemeClr val="tx1"/>
-                </a:solidFill>
-                <a:latin typeface="Arial" charset="0"/>
-                <a:ea typeface="ＭＳ Ｐゴシック" charset="-128"/>
-              </a:defRPr>
-            </a:lvl5pPr>
-            <a:lvl6pPr marL="2514600" indent="-228600" defTabSz="457200" eaLnBrk="0" fontAlgn="base" hangingPunct="0">
-              <a:spcBef>
-                <a:spcPct val="0"/>
-              </a:spcBef>
-              <a:spcAft>
-                <a:spcPct val="0"/>
-              </a:spcAft>
-              <a:defRPr>
-                <a:solidFill>
-                  <a:schemeClr val="tx1"/>
-                </a:solidFill>
-                <a:latin typeface="Arial" charset="0"/>
-                <a:ea typeface="ＭＳ Ｐゴシック" charset="-128"/>
-              </a:defRPr>
-            </a:lvl6pPr>
-            <a:lvl7pPr marL="2971800" indent="-228600" defTabSz="457200" eaLnBrk="0" fontAlgn="base" hangingPunct="0">
-              <a:spcBef>
-                <a:spcPct val="0"/>
-              </a:spcBef>
-              <a:spcAft>
-                <a:spcPct val="0"/>
-              </a:spcAft>
-              <a:defRPr>
-                <a:solidFill>
-                  <a:schemeClr val="tx1"/>
-                </a:solidFill>
-                <a:latin typeface="Arial" charset="0"/>
-                <a:ea typeface="ＭＳ Ｐゴシック" charset="-128"/>
-              </a:defRPr>
-            </a:lvl7pPr>
-            <a:lvl8pPr marL="3429000" indent="-228600" defTabSz="457200" eaLnBrk="0" fontAlgn="base" hangingPunct="0">
-              <a:spcBef>
-                <a:spcPct val="0"/>
-              </a:spcBef>
-              <a:spcAft>
-                <a:spcPct val="0"/>
-              </a:spcAft>
-              <a:defRPr>
-                <a:solidFill>
-                  <a:schemeClr val="tx1"/>
-                </a:solidFill>
-                <a:latin typeface="Arial" charset="0"/>
-                <a:ea typeface="ＭＳ Ｐゴシック" charset="-128"/>
-              </a:defRPr>
-            </a:lvl8pPr>
-            <a:lvl9pPr marL="3886200" indent="-228600" defTabSz="457200" eaLnBrk="0" fontAlgn="base" hangingPunct="0">
-              <a:spcBef>
-                <a:spcPct val="0"/>
-              </a:spcBef>
-              <a:spcAft>
-                <a:spcPct val="0"/>
-              </a:spcAft>
-              <a:defRPr>
-                <a:solidFill>
-                  <a:schemeClr val="tx1"/>
-                </a:solidFill>
-                <a:latin typeface="Arial" charset="0"/>
-                <a:ea typeface="ＭＳ Ｐゴシック" charset="-128"/>
-              </a:defRPr>
-            </a:lvl9pPr>
-          </a:lstStyle>
-          <a:p>
-            <a:r>
-              <a:rPr lang="en-US" altLang="x-none" dirty="0" smtClean="0">
-                <a:solidFill>
-                  <a:srgbClr val="898989"/>
-                </a:solidFill>
-                <a:latin typeface="Calibri" charset="0"/>
-              </a:rPr>
-              <a:t>Beck, </a:t>
-            </a:r>
-            <a:r>
-              <a:rPr lang="en-US" altLang="x-none" dirty="0" err="1" smtClean="0">
-                <a:solidFill>
-                  <a:srgbClr val="898989"/>
-                </a:solidFill>
-                <a:latin typeface="Calibri" charset="0"/>
-              </a:rPr>
-              <a:t>Hellerstein</a:t>
-            </a:r>
-            <a:r>
-              <a:rPr lang="en-US" altLang="x-none" dirty="0" smtClean="0">
-                <a:solidFill>
-                  <a:srgbClr val="898989"/>
-                </a:solidFill>
-                <a:latin typeface="Calibri" charset="0"/>
-              </a:rPr>
-              <a:t> &amp; </a:t>
-            </a:r>
-            <a:r>
-              <a:rPr lang="en-US" altLang="x-none" dirty="0" err="1" smtClean="0">
-                <a:solidFill>
-                  <a:srgbClr val="898989"/>
-                </a:solidFill>
-                <a:latin typeface="Calibri" charset="0"/>
-              </a:rPr>
-              <a:t>VanderPlas</a:t>
-            </a:r>
-            <a:r>
-              <a:rPr lang="en-US" altLang="x-none" dirty="0" smtClean="0">
-                <a:solidFill>
-                  <a:srgbClr val="898989"/>
-                </a:solidFill>
-                <a:latin typeface="Calibri" charset="0"/>
-              </a:rPr>
-              <a:t>, 2018</a:t>
-            </a:r>
-            <a:endParaRPr lang="en-US" altLang="x-none" dirty="0">
-              <a:solidFill>
-                <a:srgbClr val="898989"/>
-              </a:solidFill>
-              <a:latin typeface="Calibri" charset="0"/>
-            </a:endParaRPr>
-          </a:p>
-        </p:txBody>
-      </p:sp>
-    </p:spTree>
-  </p:cSld>
-  <p:clrMapOvr>
-    <a:masterClrMapping/>
-  </p:clrMapOvr>
-  <p:timing>
-    <p:tnLst>
-      <p:par>
-        <p:cTn id="1" dur="indefinite" restart="never" nodeType="tmRoot"/>
-      </p:par>
-    </p:tnLst>
-  </p:timing>
-</p:sld>
-</file>
-
-<file path=ppt/slides/slide20.xml><?xml version="1.0" encoding="utf-8"?>
+<file path=ppt/slides/slide21.xml><?xml version="1.0" encoding="utf-8"?>
 <p:sld xmlns:a="http://schemas.openxmlformats.org/drawingml/2006/main" xmlns:r="http://schemas.openxmlformats.org/officeDocument/2006/relationships" xmlns:p="http://schemas.openxmlformats.org/presentationml/2006/main">
   <p:cSld>
     <p:spTree>
@@ -12971,7 +13452,7 @@
 </p:sld>
 </file>
 
-<file path=ppt/slides/slide21.xml><?xml version="1.0" encoding="utf-8"?>
+<file path=ppt/slides/slide22.xml><?xml version="1.0" encoding="utf-8"?>
 <p:sld xmlns:a="http://schemas.openxmlformats.org/drawingml/2006/main" xmlns:r="http://schemas.openxmlformats.org/officeDocument/2006/relationships" xmlns:p="http://schemas.openxmlformats.org/presentationml/2006/main">
   <p:cSld>
     <p:spTree>
@@ -13630,7 +14111,7 @@
 </p:sld>
 </file>
 
-<file path=ppt/slides/slide22.xml><?xml version="1.0" encoding="utf-8"?>
+<file path=ppt/slides/slide23.xml><?xml version="1.0" encoding="utf-8"?>
 <p:sld xmlns:a="http://schemas.openxmlformats.org/drawingml/2006/main" xmlns:r="http://schemas.openxmlformats.org/officeDocument/2006/relationships" xmlns:p="http://schemas.openxmlformats.org/presentationml/2006/main">
   <p:cSld>
     <p:spTree>

</xml_diff>